<commit_message>
slide about running jupyter
</commit_message>
<xml_diff>
--- a/instructors/10_Reusable-analysis.pptx
+++ b/instructors/10_Reusable-analysis.pptx
@@ -5,7 +5,7 @@
     <p:sldMasterId id="2147483648" r:id="rId1"/>
   </p:sldMasterIdLst>
   <p:notesMasterIdLst>
-    <p:notesMasterId r:id="rId22"/>
+    <p:notesMasterId r:id="rId23"/>
   </p:notesMasterIdLst>
   <p:sldIdLst>
     <p:sldId id="276" r:id="rId2"/>
@@ -18,16 +18,17 @@
     <p:sldId id="280" r:id="rId9"/>
     <p:sldId id="285" r:id="rId10"/>
     <p:sldId id="287" r:id="rId11"/>
-    <p:sldId id="281" r:id="rId12"/>
-    <p:sldId id="284" r:id="rId13"/>
-    <p:sldId id="286" r:id="rId14"/>
-    <p:sldId id="288" r:id="rId15"/>
-    <p:sldId id="289" r:id="rId16"/>
-    <p:sldId id="290" r:id="rId17"/>
-    <p:sldId id="291" r:id="rId18"/>
-    <p:sldId id="292" r:id="rId19"/>
-    <p:sldId id="293" r:id="rId20"/>
-    <p:sldId id="294" r:id="rId21"/>
+    <p:sldId id="295" r:id="rId12"/>
+    <p:sldId id="281" r:id="rId13"/>
+    <p:sldId id="284" r:id="rId14"/>
+    <p:sldId id="286" r:id="rId15"/>
+    <p:sldId id="288" r:id="rId16"/>
+    <p:sldId id="289" r:id="rId17"/>
+    <p:sldId id="290" r:id="rId18"/>
+    <p:sldId id="291" r:id="rId19"/>
+    <p:sldId id="292" r:id="rId20"/>
+    <p:sldId id="293" r:id="rId21"/>
+    <p:sldId id="294" r:id="rId22"/>
   </p:sldIdLst>
   <p:sldSz cx="12192000" cy="6858000"/>
   <p:notesSz cx="6858000" cy="9144000"/>
@@ -216,7 +217,7 @@
           <a:p>
             <a:fld id="{585C48AE-4A1E-9A43-835F-510354165F99}" type="datetimeFigureOut">
               <a:rPr lang="en-GB" smtClean="0"/>
-              <a:t>18/01/2023</a:t>
+              <a:t>02/04/2023</a:t>
             </a:fld>
             <a:endParaRPr lang="en-GB" dirty="0"/>
           </a:p>
@@ -632,7 +633,7 @@
           <a:p>
             <a:fld id="{B361C124-7373-F149-A166-BB8240B9FE77}" type="slidenum">
               <a:rPr lang="en-GB" smtClean="0"/>
-              <a:t>11</a:t>
+              <a:t>12</a:t>
             </a:fld>
             <a:endParaRPr lang="en-GB" dirty="0"/>
           </a:p>
@@ -800,7 +801,7 @@
           <a:p>
             <a:fld id="{5913FB77-D8DB-4AB9-8EA5-EE8C3B57A5E1}" type="datetimeFigureOut">
               <a:rPr lang="en-GB" smtClean="0"/>
-              <a:t>18/01/2023</a:t>
+              <a:t>02/04/2023</a:t>
             </a:fld>
             <a:endParaRPr lang="en-GB" dirty="0"/>
           </a:p>
@@ -1000,7 +1001,7 @@
           <a:p>
             <a:fld id="{5913FB77-D8DB-4AB9-8EA5-EE8C3B57A5E1}" type="datetimeFigureOut">
               <a:rPr lang="en-GB" smtClean="0"/>
-              <a:t>18/01/2023</a:t>
+              <a:t>02/04/2023</a:t>
             </a:fld>
             <a:endParaRPr lang="en-GB" dirty="0"/>
           </a:p>
@@ -1210,7 +1211,7 @@
           <a:p>
             <a:fld id="{5913FB77-D8DB-4AB9-8EA5-EE8C3B57A5E1}" type="datetimeFigureOut">
               <a:rPr lang="en-GB" smtClean="0"/>
-              <a:t>18/01/2023</a:t>
+              <a:t>02/04/2023</a:t>
             </a:fld>
             <a:endParaRPr lang="en-GB" dirty="0"/>
           </a:p>
@@ -1410,7 +1411,7 @@
           <a:p>
             <a:fld id="{5913FB77-D8DB-4AB9-8EA5-EE8C3B57A5E1}" type="datetimeFigureOut">
               <a:rPr lang="en-GB" smtClean="0"/>
-              <a:t>18/01/2023</a:t>
+              <a:t>02/04/2023</a:t>
             </a:fld>
             <a:endParaRPr lang="en-GB" dirty="0"/>
           </a:p>
@@ -1686,7 +1687,7 @@
           <a:p>
             <a:fld id="{5913FB77-D8DB-4AB9-8EA5-EE8C3B57A5E1}" type="datetimeFigureOut">
               <a:rPr lang="en-GB" smtClean="0"/>
-              <a:t>18/01/2023</a:t>
+              <a:t>02/04/2023</a:t>
             </a:fld>
             <a:endParaRPr lang="en-GB" dirty="0"/>
           </a:p>
@@ -1954,7 +1955,7 @@
           <a:p>
             <a:fld id="{5913FB77-D8DB-4AB9-8EA5-EE8C3B57A5E1}" type="datetimeFigureOut">
               <a:rPr lang="en-GB" smtClean="0"/>
-              <a:t>18/01/2023</a:t>
+              <a:t>02/04/2023</a:t>
             </a:fld>
             <a:endParaRPr lang="en-GB" dirty="0"/>
           </a:p>
@@ -2369,7 +2370,7 @@
           <a:p>
             <a:fld id="{5913FB77-D8DB-4AB9-8EA5-EE8C3B57A5E1}" type="datetimeFigureOut">
               <a:rPr lang="en-GB" smtClean="0"/>
-              <a:t>18/01/2023</a:t>
+              <a:t>02/04/2023</a:t>
             </a:fld>
             <a:endParaRPr lang="en-GB" dirty="0"/>
           </a:p>
@@ -2511,7 +2512,7 @@
           <a:p>
             <a:fld id="{5913FB77-D8DB-4AB9-8EA5-EE8C3B57A5E1}" type="datetimeFigureOut">
               <a:rPr lang="en-GB" smtClean="0"/>
-              <a:t>18/01/2023</a:t>
+              <a:t>02/04/2023</a:t>
             </a:fld>
             <a:endParaRPr lang="en-GB" dirty="0"/>
           </a:p>
@@ -2624,7 +2625,7 @@
           <a:p>
             <a:fld id="{5913FB77-D8DB-4AB9-8EA5-EE8C3B57A5E1}" type="datetimeFigureOut">
               <a:rPr lang="en-GB" smtClean="0"/>
-              <a:t>18/01/2023</a:t>
+              <a:t>02/04/2023</a:t>
             </a:fld>
             <a:endParaRPr lang="en-GB" dirty="0"/>
           </a:p>
@@ -2937,7 +2938,7 @@
           <a:p>
             <a:fld id="{5913FB77-D8DB-4AB9-8EA5-EE8C3B57A5E1}" type="datetimeFigureOut">
               <a:rPr lang="en-GB" smtClean="0"/>
-              <a:t>18/01/2023</a:t>
+              <a:t>02/04/2023</a:t>
             </a:fld>
             <a:endParaRPr lang="en-GB" dirty="0"/>
           </a:p>
@@ -3226,7 +3227,7 @@
           <a:p>
             <a:fld id="{5913FB77-D8DB-4AB9-8EA5-EE8C3B57A5E1}" type="datetimeFigureOut">
               <a:rPr lang="en-GB" smtClean="0"/>
-              <a:t>18/01/2023</a:t>
+              <a:t>02/04/2023</a:t>
             </a:fld>
             <a:endParaRPr lang="en-GB" dirty="0"/>
           </a:p>
@@ -3469,7 +3470,7 @@
           <a:p>
             <a:fld id="{5913FB77-D8DB-4AB9-8EA5-EE8C3B57A5E1}" type="datetimeFigureOut">
               <a:rPr lang="en-GB" smtClean="0"/>
-              <a:t>18/01/2023</a:t>
+              <a:t>02/04/2023</a:t>
             </a:fld>
             <a:endParaRPr lang="en-GB" dirty="0"/>
           </a:p>
@@ -4449,6 +4450,288 @@
           <a:chExt cx="0" cy="0"/>
         </a:xfrm>
       </p:grpSpPr>
+      <p:sp>
+        <p:nvSpPr>
+          <p:cNvPr id="5" name="TextBox 4">
+            <a:extLst>
+              <a:ext uri="{FF2B5EF4-FFF2-40B4-BE49-F238E27FC236}">
+                <a16:creationId xmlns:a16="http://schemas.microsoft.com/office/drawing/2014/main" id="{3A7A1F5C-9C70-4DE3-BA39-7835B2935EB3}"/>
+              </a:ext>
+            </a:extLst>
+          </p:cNvPr>
+          <p:cNvSpPr txBox="1"/>
+          <p:nvPr/>
+        </p:nvSpPr>
+        <p:spPr>
+          <a:xfrm>
+            <a:off x="1138103" y="1569406"/>
+            <a:ext cx="9756875" cy="4401205"/>
+          </a:xfrm>
+          <a:prstGeom prst="rect">
+            <a:avLst/>
+          </a:prstGeom>
+          <a:noFill/>
+        </p:spPr>
+        <p:txBody>
+          <a:bodyPr wrap="square">
+            <a:spAutoFit/>
+          </a:bodyPr>
+          <a:lstStyle/>
+          <a:p>
+            <a:r>
+              <a:rPr lang="en-GB" sz="2800" dirty="0" smtClean="0">
+                <a:solidFill>
+                  <a:srgbClr val="0070C0"/>
+                </a:solidFill>
+              </a:rPr>
+              <a:t>The easiest way is to run it locally on your machine</a:t>
+            </a:r>
+          </a:p>
+          <a:p>
+            <a:pPr marL="457200" indent="-457200">
+              <a:buFont typeface="Arial" panose="020B0604020202020204" pitchFamily="34" charset="0"/>
+              <a:buChar char="•"/>
+            </a:pPr>
+            <a:r>
+              <a:rPr lang="en-GB" sz="2800" dirty="0" smtClean="0">
+                <a:solidFill>
+                  <a:srgbClr val="0070C0"/>
+                </a:solidFill>
+              </a:rPr>
+              <a:t>We recommend installing anaconda (https://anaconda.org/)</a:t>
+            </a:r>
+            <a:endParaRPr lang="en-GB" sz="2800" dirty="0" smtClean="0">
+              <a:solidFill>
+                <a:srgbClr val="0070C0"/>
+              </a:solidFill>
+            </a:endParaRPr>
+          </a:p>
+          <a:p>
+            <a:pPr marL="457200" indent="-457200">
+              <a:buFont typeface="Arial" panose="020B0604020202020204" pitchFamily="34" charset="0"/>
+              <a:buChar char="•"/>
+            </a:pPr>
+            <a:r>
+              <a:rPr lang="en-GB" sz="2800" dirty="0" smtClean="0">
+                <a:solidFill>
+                  <a:srgbClr val="0070C0"/>
+                </a:solidFill>
+              </a:rPr>
+              <a:t>And follow the</a:t>
+            </a:r>
+            <a:r>
+              <a:rPr lang="pl-PL" sz="2800" dirty="0" smtClean="0">
+                <a:solidFill>
+                  <a:srgbClr val="0070C0"/>
+                </a:solidFill>
+              </a:rPr>
+              <a:t> jupyter installation</a:t>
+            </a:r>
+            <a:r>
+              <a:rPr lang="en-GB" sz="2800" dirty="0" smtClean="0">
+                <a:solidFill>
+                  <a:srgbClr val="0070C0"/>
+                </a:solidFill>
+              </a:rPr>
+              <a:t> guidelines</a:t>
+            </a:r>
+          </a:p>
+          <a:p>
+            <a:pPr marL="457200" indent="-457200">
+              <a:buFont typeface="Arial" panose="020B0604020202020204" pitchFamily="34" charset="0"/>
+              <a:buChar char="•"/>
+            </a:pPr>
+            <a:endParaRPr lang="pl-PL" sz="2800" dirty="0">
+              <a:solidFill>
+                <a:srgbClr val="0070C0"/>
+              </a:solidFill>
+            </a:endParaRPr>
+          </a:p>
+          <a:p>
+            <a:r>
+              <a:rPr lang="en-GB" sz="2800" dirty="0" err="1" smtClean="0">
+                <a:solidFill>
+                  <a:srgbClr val="0070C0"/>
+                </a:solidFill>
+              </a:rPr>
+              <a:t>Jupyter</a:t>
+            </a:r>
+            <a:r>
+              <a:rPr lang="en-GB" sz="2800" dirty="0" smtClean="0">
+                <a:solidFill>
+                  <a:srgbClr val="0070C0"/>
+                </a:solidFill>
+              </a:rPr>
+              <a:t> can be run on the server and accessed remotely (as in our example)</a:t>
+            </a:r>
+          </a:p>
+          <a:p>
+            <a:endParaRPr lang="pl-PL" sz="2800" dirty="0">
+              <a:solidFill>
+                <a:srgbClr val="0070C0"/>
+              </a:solidFill>
+            </a:endParaRPr>
+          </a:p>
+          <a:p>
+            <a:pPr marL="457200" indent="-457200">
+              <a:buFont typeface="Arial" panose="020B0604020202020204" pitchFamily="34" charset="0"/>
+              <a:buChar char="•"/>
+            </a:pPr>
+            <a:endParaRPr lang="pl-PL" sz="2800" dirty="0">
+              <a:solidFill>
+                <a:srgbClr val="0070C0"/>
+              </a:solidFill>
+            </a:endParaRPr>
+          </a:p>
+          <a:p>
+            <a:endParaRPr lang="pl-PL" sz="2800" dirty="0">
+              <a:solidFill>
+                <a:srgbClr val="0070C0"/>
+              </a:solidFill>
+            </a:endParaRPr>
+          </a:p>
+          <a:p>
+            <a:pPr marL="457200" indent="-457200">
+              <a:buFont typeface="Arial" panose="020B0604020202020204" pitchFamily="34" charset="0"/>
+              <a:buChar char="•"/>
+            </a:pPr>
+            <a:endParaRPr lang="en-GB" sz="2800" dirty="0">
+              <a:solidFill>
+                <a:srgbClr val="0070C0"/>
+              </a:solidFill>
+            </a:endParaRPr>
+          </a:p>
+        </p:txBody>
+      </p:sp>
+      <p:pic>
+        <p:nvPicPr>
+          <p:cNvPr id="6" name="Picture 2" descr="Ed_DaSH">
+            <a:extLst>
+              <a:ext uri="{FF2B5EF4-FFF2-40B4-BE49-F238E27FC236}">
+                <a16:creationId xmlns:a16="http://schemas.microsoft.com/office/drawing/2014/main" id="{6F3CF586-06D2-46C3-A4A3-130E31C4A16F}"/>
+              </a:ext>
+            </a:extLst>
+          </p:cNvPr>
+          <p:cNvPicPr>
+            <a:picLocks noChangeAspect="1" noChangeArrowheads="1"/>
+          </p:cNvPicPr>
+          <p:nvPr/>
+        </p:nvPicPr>
+        <p:blipFill>
+          <a:blip r:embed="rId2" cstate="hqprint">
+            <a:extLst>
+              <a:ext uri="{28A0092B-C50C-407E-A947-70E740481C1C}">
+                <a14:useLocalDpi xmlns:a14="http://schemas.microsoft.com/office/drawing/2010/main" val="0"/>
+              </a:ext>
+            </a:extLst>
+          </a:blip>
+          <a:srcRect/>
+          <a:stretch>
+            <a:fillRect/>
+          </a:stretch>
+        </p:blipFill>
+        <p:spPr bwMode="auto">
+          <a:xfrm>
+            <a:off x="10820670" y="5458691"/>
+            <a:ext cx="1289214" cy="1325418"/>
+          </a:xfrm>
+          <a:prstGeom prst="rect">
+            <a:avLst/>
+          </a:prstGeom>
+          <a:noFill/>
+          <a:extLst>
+            <a:ext uri="{909E8E84-426E-40DD-AFC4-6F175D3DCCD1}">
+              <a14:hiddenFill xmlns:a14="http://schemas.microsoft.com/office/drawing/2010/main">
+                <a:solidFill>
+                  <a:srgbClr val="FFFFFF"/>
+                </a:solidFill>
+              </a14:hiddenFill>
+            </a:ext>
+          </a:extLst>
+        </p:spPr>
+      </p:pic>
+      <p:sp>
+        <p:nvSpPr>
+          <p:cNvPr id="4" name="Title 1">
+            <a:extLst>
+              <a:ext uri="{FF2B5EF4-FFF2-40B4-BE49-F238E27FC236}">
+                <a16:creationId xmlns:a16="http://schemas.microsoft.com/office/drawing/2014/main" id="{D21F9EF6-69ED-40F9-83C6-60B65781CE8B}"/>
+              </a:ext>
+            </a:extLst>
+          </p:cNvPr>
+          <p:cNvSpPr>
+            <a:spLocks noGrp="1"/>
+          </p:cNvSpPr>
+          <p:nvPr>
+            <p:ph type="title"/>
+          </p:nvPr>
+        </p:nvSpPr>
+        <p:spPr>
+          <a:xfrm>
+            <a:off x="838200" y="365125"/>
+            <a:ext cx="10515600" cy="587375"/>
+          </a:xfrm>
+        </p:spPr>
+        <p:txBody>
+          <a:bodyPr>
+            <a:normAutofit fontScale="90000"/>
+          </a:bodyPr>
+          <a:lstStyle/>
+          <a:p>
+            <a:r>
+              <a:rPr lang="pl-PL" dirty="0">
+                <a:solidFill>
+                  <a:srgbClr val="0070C0"/>
+                </a:solidFill>
+              </a:rPr>
+              <a:t>Jupyter notebook </a:t>
+            </a:r>
+            <a:r>
+              <a:rPr lang="pl-PL" dirty="0" smtClean="0">
+                <a:solidFill>
+                  <a:srgbClr val="0070C0"/>
+                </a:solidFill>
+              </a:rPr>
+              <a:t>running</a:t>
+            </a:r>
+            <a:endParaRPr lang="en-GB" dirty="0">
+              <a:solidFill>
+                <a:srgbClr val="0070C0"/>
+              </a:solidFill>
+            </a:endParaRPr>
+          </a:p>
+        </p:txBody>
+      </p:sp>
+    </p:spTree>
+    <p:extLst>
+      <p:ext uri="{BB962C8B-B14F-4D97-AF65-F5344CB8AC3E}">
+        <p14:creationId xmlns:p14="http://schemas.microsoft.com/office/powerpoint/2010/main" val="1168856598"/>
+      </p:ext>
+    </p:extLst>
+  </p:cSld>
+  <p:clrMapOvr>
+    <a:masterClrMapping/>
+  </p:clrMapOvr>
+</p:sld>
+</file>
+
+<file path=ppt/slides/slide12.xml><?xml version="1.0" encoding="utf-8"?>
+<p:sld xmlns:a="http://schemas.openxmlformats.org/drawingml/2006/main" xmlns:r="http://schemas.openxmlformats.org/officeDocument/2006/relationships" xmlns:p="http://schemas.openxmlformats.org/presentationml/2006/main">
+  <p:cSld>
+    <p:spTree>
+      <p:nvGrpSpPr>
+        <p:cNvPr id="1" name=""/>
+        <p:cNvGrpSpPr/>
+        <p:nvPr/>
+      </p:nvGrpSpPr>
+      <p:grpSpPr>
+        <a:xfrm>
+          <a:off x="0" y="0"/>
+          <a:ext cx="0" cy="0"/>
+          <a:chOff x="0" y="0"/>
+          <a:chExt cx="0" cy="0"/>
+        </a:xfrm>
+      </p:grpSpPr>
       <p:pic>
         <p:nvPicPr>
           <p:cNvPr id="33" name="Picture 31">
@@ -4507,7 +4790,7 @@
           <a:graphicData uri="http://schemas.openxmlformats.org/presentationml/2006/ole">
             <mc:AlternateContent xmlns:mc="http://schemas.openxmlformats.org/markup-compatibility/2006">
               <mc:Choice xmlns:v="urn:schemas-microsoft-com:vml" Requires="v">
-                <p:oleObj spid="_x0000_s2062" name="Image" r:id="rId5" imgW="4926984" imgH="6171429" progId="Photoshop.Image.11">
+                <p:oleObj spid="_x0000_s2070" name="Image" r:id="rId5" imgW="4926984" imgH="6171429" progId="Photoshop.Image.11">
                   <p:embed/>
                 </p:oleObj>
               </mc:Choice>
@@ -4745,7 +5028,7 @@
           <a:graphicData uri="http://schemas.openxmlformats.org/presentationml/2006/ole">
             <mc:AlternateContent xmlns:mc="http://schemas.openxmlformats.org/markup-compatibility/2006">
               <mc:Choice xmlns:v="urn:schemas-microsoft-com:vml" Requires="v">
-                <p:oleObj spid="_x0000_s2063" name="Image" r:id="rId9" imgW="4926984" imgH="6171429" progId="Photoshop.Image.11">
+                <p:oleObj spid="_x0000_s2071" name="Image" r:id="rId9" imgW="4926984" imgH="6171429" progId="Photoshop.Image.11">
                   <p:embed/>
                 </p:oleObj>
               </mc:Choice>
@@ -5221,7 +5504,7 @@
           <a:graphicData uri="http://schemas.openxmlformats.org/presentationml/2006/ole">
             <mc:AlternateContent xmlns:mc="http://schemas.openxmlformats.org/markup-compatibility/2006">
               <mc:Choice xmlns:v="urn:schemas-microsoft-com:vml" Requires="v">
-                <p:oleObj spid="_x0000_s2064" name="Image" r:id="rId14" imgW="4926984" imgH="6171429" progId="Photoshop.Image.11">
+                <p:oleObj spid="_x0000_s2072" name="Image" r:id="rId14" imgW="4926984" imgH="6171429" progId="Photoshop.Image.11">
                   <p:embed/>
                 </p:oleObj>
               </mc:Choice>
@@ -5368,7 +5651,7 @@
           <a:graphicData uri="http://schemas.openxmlformats.org/presentationml/2006/ole">
             <mc:AlternateContent xmlns:mc="http://schemas.openxmlformats.org/markup-compatibility/2006">
               <mc:Choice xmlns:v="urn:schemas-microsoft-com:vml" Requires="v">
-                <p:oleObj spid="_x0000_s2065" name="Image" r:id="rId9" imgW="4926984" imgH="6171429" progId="Photoshop.Image.11">
+                <p:oleObj spid="_x0000_s2073" name="Image" r:id="rId9" imgW="4926984" imgH="6171429" progId="Photoshop.Image.11">
                   <p:embed/>
                 </p:oleObj>
               </mc:Choice>
@@ -5745,412 +6028,6 @@
 </p:sld>
 </file>
 
-<file path=ppt/slides/slide12.xml><?xml version="1.0" encoding="utf-8"?>
-<p:sld xmlns:a="http://schemas.openxmlformats.org/drawingml/2006/main" xmlns:r="http://schemas.openxmlformats.org/officeDocument/2006/relationships" xmlns:p="http://schemas.openxmlformats.org/presentationml/2006/main">
-  <p:cSld>
-    <p:spTree>
-      <p:nvGrpSpPr>
-        <p:cNvPr id="1" name=""/>
-        <p:cNvGrpSpPr/>
-        <p:nvPr/>
-      </p:nvGrpSpPr>
-      <p:grpSpPr>
-        <a:xfrm>
-          <a:off x="0" y="0"/>
-          <a:ext cx="0" cy="0"/>
-          <a:chOff x="0" y="0"/>
-          <a:chExt cx="0" cy="0"/>
-        </a:xfrm>
-      </p:grpSpPr>
-      <p:sp>
-        <p:nvSpPr>
-          <p:cNvPr id="5" name="TextBox 4">
-            <a:extLst>
-              <a:ext uri="{FF2B5EF4-FFF2-40B4-BE49-F238E27FC236}">
-                <a16:creationId xmlns:a16="http://schemas.microsoft.com/office/drawing/2014/main" id="{3A7A1F5C-9C70-4DE3-BA39-7835B2935EB3}"/>
-              </a:ext>
-            </a:extLst>
-          </p:cNvPr>
-          <p:cNvSpPr txBox="1"/>
-          <p:nvPr/>
-        </p:nvSpPr>
-        <p:spPr>
-          <a:xfrm>
-            <a:off x="1138104" y="1569406"/>
-            <a:ext cx="9464530" cy="2677656"/>
-          </a:xfrm>
-          <a:prstGeom prst="rect">
-            <a:avLst/>
-          </a:prstGeom>
-          <a:noFill/>
-        </p:spPr>
-        <p:txBody>
-          <a:bodyPr wrap="square">
-            <a:spAutoFit/>
-          </a:bodyPr>
-          <a:lstStyle/>
-          <a:p>
-            <a:pPr marL="457200" indent="-457200">
-              <a:buFont typeface="Arial" panose="020B0604020202020204" pitchFamily="34" charset="0"/>
-              <a:buChar char="•"/>
-            </a:pPr>
-            <a:r>
-              <a:rPr lang="pl-PL" sz="2800" dirty="0" err="1">
-                <a:solidFill>
-                  <a:srgbClr val="0070C0"/>
-                </a:solidFill>
-              </a:rPr>
-              <a:t>Robust</a:t>
-            </a:r>
-            <a:r>
-              <a:rPr lang="pl-PL" sz="2800" dirty="0">
-                <a:solidFill>
-                  <a:srgbClr val="0070C0"/>
-                </a:solidFill>
-              </a:rPr>
-              <a:t> (re-</a:t>
-            </a:r>
-            <a:r>
-              <a:rPr lang="pl-PL" sz="2800" dirty="0" err="1">
-                <a:solidFill>
-                  <a:srgbClr val="0070C0"/>
-                </a:solidFill>
-              </a:rPr>
-              <a:t>starting</a:t>
-            </a:r>
-            <a:r>
-              <a:rPr lang="pl-PL" sz="2800" dirty="0">
-                <a:solidFill>
-                  <a:srgbClr val="0070C0"/>
-                </a:solidFill>
-              </a:rPr>
-              <a:t> </a:t>
-            </a:r>
-            <a:r>
-              <a:rPr lang="pl-PL" sz="2800" dirty="0" err="1">
-                <a:solidFill>
-                  <a:srgbClr val="0070C0"/>
-                </a:solidFill>
-              </a:rPr>
-              <a:t>job</a:t>
-            </a:r>
-            <a:r>
-              <a:rPr lang="pl-PL" sz="2800" dirty="0">
-                <a:solidFill>
-                  <a:srgbClr val="0070C0"/>
-                </a:solidFill>
-              </a:rPr>
-              <a:t>)</a:t>
-            </a:r>
-          </a:p>
-          <a:p>
-            <a:pPr marL="457200" indent="-457200">
-              <a:buFont typeface="Arial" panose="020B0604020202020204" pitchFamily="34" charset="0"/>
-              <a:buChar char="•"/>
-            </a:pPr>
-            <a:r>
-              <a:rPr lang="pl-PL" sz="2800" dirty="0" err="1">
-                <a:solidFill>
-                  <a:srgbClr val="0070C0"/>
-                </a:solidFill>
-              </a:rPr>
-              <a:t>Efficient</a:t>
-            </a:r>
-            <a:r>
-              <a:rPr lang="pl-PL" sz="2800" dirty="0">
-                <a:solidFill>
-                  <a:srgbClr val="0070C0"/>
-                </a:solidFill>
-              </a:rPr>
-              <a:t> (paralel </a:t>
-            </a:r>
-            <a:r>
-              <a:rPr lang="pl-PL" sz="2800" dirty="0" err="1">
-                <a:solidFill>
-                  <a:srgbClr val="0070C0"/>
-                </a:solidFill>
-              </a:rPr>
-              <a:t>computing</a:t>
-            </a:r>
-            <a:r>
-              <a:rPr lang="pl-PL" sz="2800" dirty="0">
-                <a:solidFill>
-                  <a:srgbClr val="0070C0"/>
-                </a:solidFill>
-              </a:rPr>
-              <a:t>)</a:t>
-            </a:r>
-          </a:p>
-          <a:p>
-            <a:pPr marL="457200" indent="-457200">
-              <a:buFont typeface="Arial" panose="020B0604020202020204" pitchFamily="34" charset="0"/>
-              <a:buChar char="•"/>
-            </a:pPr>
-            <a:r>
-              <a:rPr lang="pl-PL" sz="2800" dirty="0" err="1">
-                <a:solidFill>
-                  <a:srgbClr val="0070C0"/>
-                </a:solidFill>
-              </a:rPr>
-              <a:t>Methodological</a:t>
-            </a:r>
-            <a:r>
-              <a:rPr lang="pl-PL" sz="2800" dirty="0">
-                <a:solidFill>
-                  <a:srgbClr val="0070C0"/>
-                </a:solidFill>
-              </a:rPr>
-              <a:t> </a:t>
-            </a:r>
-            <a:r>
-              <a:rPr lang="pl-PL" sz="2800" dirty="0" err="1">
-                <a:solidFill>
-                  <a:srgbClr val="0070C0"/>
-                </a:solidFill>
-              </a:rPr>
-              <a:t>sound</a:t>
-            </a:r>
-            <a:endParaRPr lang="pl-PL" sz="2800" dirty="0">
-              <a:solidFill>
-                <a:srgbClr val="0070C0"/>
-              </a:solidFill>
-            </a:endParaRPr>
-          </a:p>
-          <a:p>
-            <a:pPr marL="457200" indent="-457200">
-              <a:buFont typeface="Arial" panose="020B0604020202020204" pitchFamily="34" charset="0"/>
-              <a:buChar char="•"/>
-            </a:pPr>
-            <a:r>
-              <a:rPr lang="pl-PL" sz="2800" dirty="0" err="1">
-                <a:solidFill>
-                  <a:srgbClr val="0070C0"/>
-                </a:solidFill>
-              </a:rPr>
-              <a:t>Easy</a:t>
-            </a:r>
-            <a:r>
-              <a:rPr lang="pl-PL" sz="2800" dirty="0">
-                <a:solidFill>
-                  <a:srgbClr val="0070C0"/>
-                </a:solidFill>
-              </a:rPr>
-              <a:t> to </a:t>
-            </a:r>
-            <a:r>
-              <a:rPr lang="pl-PL" sz="2800" dirty="0" err="1">
-                <a:solidFill>
-                  <a:srgbClr val="0070C0"/>
-                </a:solidFill>
-              </a:rPr>
-              <a:t>maintain</a:t>
-            </a:r>
-            <a:endParaRPr lang="pl-PL" sz="2800" dirty="0">
-              <a:solidFill>
-                <a:srgbClr val="0070C0"/>
-              </a:solidFill>
-            </a:endParaRPr>
-          </a:p>
-          <a:p>
-            <a:pPr marL="457200" indent="-457200">
-              <a:buFont typeface="Arial" panose="020B0604020202020204" pitchFamily="34" charset="0"/>
-              <a:buChar char="•"/>
-            </a:pPr>
-            <a:r>
-              <a:rPr lang="pl-PL" sz="2800" dirty="0" err="1">
-                <a:solidFill>
-                  <a:srgbClr val="0070C0"/>
-                </a:solidFill>
-              </a:rPr>
-              <a:t>Well</a:t>
-            </a:r>
-            <a:r>
-              <a:rPr lang="pl-PL" sz="2800" dirty="0">
-                <a:solidFill>
-                  <a:srgbClr val="0070C0"/>
-                </a:solidFill>
-              </a:rPr>
-              <a:t> </a:t>
-            </a:r>
-            <a:r>
-              <a:rPr lang="pl-PL" sz="2800" dirty="0" err="1">
-                <a:solidFill>
-                  <a:srgbClr val="0070C0"/>
-                </a:solidFill>
-              </a:rPr>
-              <a:t>specified</a:t>
-            </a:r>
-            <a:r>
-              <a:rPr lang="pl-PL" sz="2800" dirty="0">
-                <a:solidFill>
-                  <a:srgbClr val="0070C0"/>
-                </a:solidFill>
-              </a:rPr>
-              <a:t> </a:t>
-            </a:r>
-            <a:r>
-              <a:rPr lang="pl-PL" sz="2800" dirty="0" err="1">
-                <a:solidFill>
-                  <a:srgbClr val="0070C0"/>
-                </a:solidFill>
-              </a:rPr>
-              <a:t>dependencies</a:t>
-            </a:r>
-            <a:endParaRPr lang="en-GB" sz="2800" dirty="0">
-              <a:solidFill>
-                <a:srgbClr val="0070C0"/>
-              </a:solidFill>
-            </a:endParaRPr>
-          </a:p>
-          <a:p>
-            <a:pPr marL="457200" indent="-457200">
-              <a:buFont typeface="Arial" panose="020B0604020202020204" pitchFamily="34" charset="0"/>
-              <a:buChar char="•"/>
-            </a:pPr>
-            <a:endParaRPr lang="en-GB" sz="2800" dirty="0">
-              <a:solidFill>
-                <a:srgbClr val="0070C0"/>
-              </a:solidFill>
-            </a:endParaRPr>
-          </a:p>
-        </p:txBody>
-      </p:sp>
-      <p:pic>
-        <p:nvPicPr>
-          <p:cNvPr id="6" name="Picture 2" descr="Ed_DaSH">
-            <a:extLst>
-              <a:ext uri="{FF2B5EF4-FFF2-40B4-BE49-F238E27FC236}">
-                <a16:creationId xmlns:a16="http://schemas.microsoft.com/office/drawing/2014/main" id="{6F3CF586-06D2-46C3-A4A3-130E31C4A16F}"/>
-              </a:ext>
-            </a:extLst>
-          </p:cNvPr>
-          <p:cNvPicPr>
-            <a:picLocks noChangeAspect="1" noChangeArrowheads="1"/>
-          </p:cNvPicPr>
-          <p:nvPr/>
-        </p:nvPicPr>
-        <p:blipFill>
-          <a:blip r:embed="rId2" cstate="hqprint">
-            <a:extLst>
-              <a:ext uri="{28A0092B-C50C-407E-A947-70E740481C1C}">
-                <a14:useLocalDpi xmlns:a14="http://schemas.microsoft.com/office/drawing/2010/main" val="0"/>
-              </a:ext>
-            </a:extLst>
-          </a:blip>
-          <a:srcRect/>
-          <a:stretch>
-            <a:fillRect/>
-          </a:stretch>
-        </p:blipFill>
-        <p:spPr bwMode="auto">
-          <a:xfrm>
-            <a:off x="10820670" y="5458691"/>
-            <a:ext cx="1289214" cy="1325418"/>
-          </a:xfrm>
-          <a:prstGeom prst="rect">
-            <a:avLst/>
-          </a:prstGeom>
-          <a:noFill/>
-          <a:extLst>
-            <a:ext uri="{909E8E84-426E-40DD-AFC4-6F175D3DCCD1}">
-              <a14:hiddenFill xmlns:a14="http://schemas.microsoft.com/office/drawing/2010/main">
-                <a:solidFill>
-                  <a:srgbClr val="FFFFFF"/>
-                </a:solidFill>
-              </a14:hiddenFill>
-            </a:ext>
-          </a:extLst>
-        </p:spPr>
-      </p:pic>
-      <p:sp>
-        <p:nvSpPr>
-          <p:cNvPr id="4" name="Title 1">
-            <a:extLst>
-              <a:ext uri="{FF2B5EF4-FFF2-40B4-BE49-F238E27FC236}">
-                <a16:creationId xmlns:a16="http://schemas.microsoft.com/office/drawing/2014/main" id="{D21F9EF6-69ED-40F9-83C6-60B65781CE8B}"/>
-              </a:ext>
-            </a:extLst>
-          </p:cNvPr>
-          <p:cNvSpPr>
-            <a:spLocks noGrp="1"/>
-          </p:cNvSpPr>
-          <p:nvPr>
-            <p:ph type="title"/>
-          </p:nvPr>
-        </p:nvSpPr>
-        <p:spPr>
-          <a:xfrm>
-            <a:off x="838200" y="365125"/>
-            <a:ext cx="10515600" cy="587375"/>
-          </a:xfrm>
-        </p:spPr>
-        <p:txBody>
-          <a:bodyPr>
-            <a:normAutofit fontScale="90000"/>
-          </a:bodyPr>
-          <a:lstStyle/>
-          <a:p>
-            <a:r>
-              <a:rPr lang="pl-PL" dirty="0" err="1">
-                <a:solidFill>
-                  <a:srgbClr val="0070C0"/>
-                </a:solidFill>
-              </a:rPr>
-              <a:t>Reusable</a:t>
-            </a:r>
-            <a:r>
-              <a:rPr lang="pl-PL" dirty="0">
-                <a:solidFill>
-                  <a:srgbClr val="0070C0"/>
-                </a:solidFill>
-              </a:rPr>
-              <a:t> </a:t>
-            </a:r>
-            <a:r>
-              <a:rPr lang="pl-PL" dirty="0" err="1">
-                <a:solidFill>
-                  <a:srgbClr val="0070C0"/>
-                </a:solidFill>
-              </a:rPr>
-              <a:t>pipeline</a:t>
-            </a:r>
-            <a:r>
-              <a:rPr lang="pl-PL" dirty="0">
-                <a:solidFill>
-                  <a:srgbClr val="0070C0"/>
-                </a:solidFill>
-              </a:rPr>
-              <a:t> - </a:t>
-            </a:r>
-            <a:r>
-              <a:rPr lang="pl-PL" dirty="0" err="1">
-                <a:solidFill>
-                  <a:srgbClr val="0070C0"/>
-                </a:solidFill>
-              </a:rPr>
-              <a:t>requirements</a:t>
-            </a:r>
-            <a:endParaRPr lang="en-GB" dirty="0">
-              <a:solidFill>
-                <a:srgbClr val="0070C0"/>
-              </a:solidFill>
-            </a:endParaRPr>
-          </a:p>
-        </p:txBody>
-      </p:sp>
-    </p:spTree>
-    <p:extLst>
-      <p:ext uri="{BB962C8B-B14F-4D97-AF65-F5344CB8AC3E}">
-        <p14:creationId xmlns:p14="http://schemas.microsoft.com/office/powerpoint/2010/main" val="372809105"/>
-      </p:ext>
-    </p:extLst>
-  </p:cSld>
-  <p:clrMapOvr>
-    <a:masterClrMapping/>
-  </p:clrMapOvr>
-</p:sld>
-</file>
-
 <file path=ppt/slides/slide13.xml><?xml version="1.0" encoding="utf-8"?>
 <p:sld xmlns:a="http://schemas.openxmlformats.org/drawingml/2006/main" xmlns:r="http://schemas.openxmlformats.org/officeDocument/2006/relationships" xmlns:p="http://schemas.openxmlformats.org/presentationml/2006/main">
   <p:cSld>
@@ -6183,7 +6060,7 @@
         <p:spPr>
           <a:xfrm>
             <a:off x="1138104" y="1569406"/>
-            <a:ext cx="9464530" cy="3970318"/>
+            <a:ext cx="9464530" cy="2677656"/>
           </a:xfrm>
           <a:prstGeom prst="rect">
             <a:avLst/>
@@ -6196,13 +6073,33 @@
           </a:bodyPr>
           <a:lstStyle/>
           <a:p>
-            <a:r>
-              <a:rPr lang="pl-PL" sz="2800" dirty="0" err="1">
-                <a:solidFill>
-                  <a:srgbClr val="0070C0"/>
-                </a:solidFill>
-              </a:rPr>
-              <a:t>Build</a:t>
+            <a:pPr marL="457200" indent="-457200">
+              <a:buFont typeface="Arial" panose="020B0604020202020204" pitchFamily="34" charset="0"/>
+              <a:buChar char="•"/>
+            </a:pPr>
+            <a:r>
+              <a:rPr lang="pl-PL" sz="2800" dirty="0" err="1">
+                <a:solidFill>
+                  <a:srgbClr val="0070C0"/>
+                </a:solidFill>
+              </a:rPr>
+              <a:t>Robust</a:t>
+            </a:r>
+            <a:r>
+              <a:rPr lang="pl-PL" sz="2800" dirty="0">
+                <a:solidFill>
+                  <a:srgbClr val="0070C0"/>
+                </a:solidFill>
+              </a:rPr>
+              <a:t> (re-</a:t>
+            </a:r>
+            <a:r>
+              <a:rPr lang="pl-PL" sz="2800" dirty="0" err="1">
+                <a:solidFill>
+                  <a:srgbClr val="0070C0"/>
+                </a:solidFill>
+              </a:rPr>
+              <a:t>starting</a:t>
             </a:r>
             <a:r>
               <a:rPr lang="pl-PL" sz="2800" dirty="0">
@@ -6218,37 +6115,21 @@
                   <a:srgbClr val="0070C0"/>
                 </a:solidFill>
               </a:rPr>
-              <a:t>it</a:t>
-            </a:r>
-            <a:r>
-              <a:rPr lang="pl-PL" sz="2800" dirty="0">
-                <a:solidFill>
-                  <a:srgbClr val="0070C0"/>
-                </a:solidFill>
-              </a:rPr>
-              <a:t> with </a:t>
-            </a:r>
-            <a:r>
-              <a:rPr lang="pl-PL" sz="2800" dirty="0" err="1">
-                <a:solidFill>
-                  <a:srgbClr val="0070C0"/>
-                </a:solidFill>
-              </a:rPr>
-              <a:t>workflows</a:t>
-            </a:r>
-            <a:r>
-              <a:rPr lang="pl-PL" sz="2800" dirty="0">
-                <a:solidFill>
-                  <a:srgbClr val="0070C0"/>
-                </a:solidFill>
-              </a:rPr>
-              <a:t>:</a:t>
+              <a:t>job</a:t>
+            </a:r>
+            <a:r>
+              <a:rPr lang="pl-PL" sz="2800" dirty="0">
+                <a:solidFill>
+                  <a:srgbClr val="0070C0"/>
+                </a:solidFill>
+              </a:rPr>
+              <a:t>)</a:t>
             </a:r>
           </a:p>
           <a:p>
             <a:pPr marL="457200" indent="-457200">
-              <a:buFontTx/>
-              <a:buChar char="-"/>
+              <a:buFont typeface="Arial" panose="020B0604020202020204" pitchFamily="34" charset="0"/>
+              <a:buChar char="•"/>
             </a:pPr>
             <a:r>
               <a:rPr lang="pl-PL" sz="2800" dirty="0" err="1">
@@ -6256,7 +6137,61 @@
                   <a:srgbClr val="0070C0"/>
                 </a:solidFill>
               </a:rPr>
-              <a:t>Nextflow</a:t>
+              <a:t>Efficient</a:t>
+            </a:r>
+            <a:r>
+              <a:rPr lang="pl-PL" sz="2800" dirty="0">
+                <a:solidFill>
+                  <a:srgbClr val="0070C0"/>
+                </a:solidFill>
+              </a:rPr>
+              <a:t> (paralel </a:t>
+            </a:r>
+            <a:r>
+              <a:rPr lang="pl-PL" sz="2800" dirty="0" err="1">
+                <a:solidFill>
+                  <a:srgbClr val="0070C0"/>
+                </a:solidFill>
+              </a:rPr>
+              <a:t>computing</a:t>
+            </a:r>
+            <a:r>
+              <a:rPr lang="pl-PL" sz="2800" dirty="0">
+                <a:solidFill>
+                  <a:srgbClr val="0070C0"/>
+                </a:solidFill>
+              </a:rPr>
+              <a:t>)</a:t>
+            </a:r>
+          </a:p>
+          <a:p>
+            <a:pPr marL="457200" indent="-457200">
+              <a:buFont typeface="Arial" panose="020B0604020202020204" pitchFamily="34" charset="0"/>
+              <a:buChar char="•"/>
+            </a:pPr>
+            <a:r>
+              <a:rPr lang="pl-PL" sz="2800" dirty="0" err="1">
+                <a:solidFill>
+                  <a:srgbClr val="0070C0"/>
+                </a:solidFill>
+              </a:rPr>
+              <a:t>Methodological</a:t>
+            </a:r>
+            <a:r>
+              <a:rPr lang="pl-PL" sz="2800" dirty="0">
+                <a:solidFill>
+                  <a:srgbClr val="0070C0"/>
+                </a:solidFill>
+              </a:rPr>
+              <a:t> </a:t>
+            </a:r>
+            <a:r>
+              <a:rPr lang="pl-PL" sz="2800" dirty="0" err="1">
+                <a:solidFill>
+                  <a:srgbClr val="0070C0"/>
+                </a:solidFill>
+              </a:rPr>
+              <a:t>sound</a:t>
             </a:r>
             <a:endParaRPr lang="pl-PL" sz="2800" dirty="0">
               <a:solidFill>
@@ -6266,8 +6201,8 @@
           </a:p>
           <a:p>
             <a:pPr marL="457200" indent="-457200">
-              <a:buFontTx/>
-              <a:buChar char="-"/>
+              <a:buFont typeface="Arial" panose="020B0604020202020204" pitchFamily="34" charset="0"/>
+              <a:buChar char="•"/>
             </a:pPr>
             <a:r>
               <a:rPr lang="pl-PL" sz="2800" dirty="0" err="1">
@@ -6275,7 +6210,23 @@
                   <a:srgbClr val="0070C0"/>
                 </a:solidFill>
               </a:rPr>
-              <a:t>Snakemake</a:t>
+              <a:t>Easy</a:t>
+            </a:r>
+            <a:r>
+              <a:rPr lang="pl-PL" sz="2800" dirty="0">
+                <a:solidFill>
+                  <a:srgbClr val="0070C0"/>
+                </a:solidFill>
+              </a:rPr>
+              <a:t> to </a:t>
+            </a:r>
+            <a:r>
+              <a:rPr lang="pl-PL" sz="2800" dirty="0" err="1">
+                <a:solidFill>
+                  <a:srgbClr val="0070C0"/>
+                </a:solidFill>
+              </a:rPr>
+              <a:t>maintain</a:t>
             </a:r>
             <a:endParaRPr lang="pl-PL" sz="2800" dirty="0">
               <a:solidFill>
@@ -6285,160 +6236,60 @@
           </a:p>
           <a:p>
             <a:pPr marL="457200" indent="-457200">
-              <a:buFontTx/>
-              <a:buChar char="-"/>
+              <a:buFont typeface="Arial" panose="020B0604020202020204" pitchFamily="34" charset="0"/>
+              <a:buChar char="•"/>
             </a:pPr>
             <a:r>
-              <a:rPr lang="pl-PL" sz="2800" dirty="0">
-                <a:solidFill>
-                  <a:srgbClr val="0070C0"/>
-                </a:solidFill>
-              </a:rPr>
-              <a:t>Galaxy</a:t>
-            </a:r>
-          </a:p>
-          <a:p>
-            <a:pPr marL="457200" indent="-457200">
-              <a:buFontTx/>
-              <a:buChar char="-"/>
-            </a:pPr>
-            <a:endParaRPr lang="pl-PL" sz="2800" dirty="0">
+              <a:rPr lang="pl-PL" sz="2800" dirty="0" err="1">
+                <a:solidFill>
+                  <a:srgbClr val="0070C0"/>
+                </a:solidFill>
+              </a:rPr>
+              <a:t>Well</a:t>
+            </a:r>
+            <a:r>
+              <a:rPr lang="pl-PL" sz="2800" dirty="0">
+                <a:solidFill>
+                  <a:srgbClr val="0070C0"/>
+                </a:solidFill>
+              </a:rPr>
+              <a:t> </a:t>
+            </a:r>
+            <a:r>
+              <a:rPr lang="pl-PL" sz="2800" dirty="0" err="1">
+                <a:solidFill>
+                  <a:srgbClr val="0070C0"/>
+                </a:solidFill>
+              </a:rPr>
+              <a:t>specified</a:t>
+            </a:r>
+            <a:r>
+              <a:rPr lang="pl-PL" sz="2800" dirty="0">
+                <a:solidFill>
+                  <a:srgbClr val="0070C0"/>
+                </a:solidFill>
+              </a:rPr>
+              <a:t> </a:t>
+            </a:r>
+            <a:r>
+              <a:rPr lang="pl-PL" sz="2800" dirty="0" err="1">
+                <a:solidFill>
+                  <a:srgbClr val="0070C0"/>
+                </a:solidFill>
+              </a:rPr>
+              <a:t>dependencies</a:t>
+            </a:r>
+            <a:endParaRPr lang="en-GB" sz="2800" dirty="0">
               <a:solidFill>
                 <a:srgbClr val="0070C0"/>
               </a:solidFill>
             </a:endParaRPr>
           </a:p>
           <a:p>
-            <a:r>
-              <a:rPr lang="pl-PL" sz="2800" dirty="0" err="1">
-                <a:solidFill>
-                  <a:srgbClr val="0070C0"/>
-                </a:solidFill>
-              </a:rPr>
-              <a:t>Well</a:t>
-            </a:r>
-            <a:r>
-              <a:rPr lang="pl-PL" sz="2800" dirty="0">
-                <a:solidFill>
-                  <a:srgbClr val="0070C0"/>
-                </a:solidFill>
-              </a:rPr>
-              <a:t> </a:t>
-            </a:r>
-            <a:r>
-              <a:rPr lang="pl-PL" sz="2800" dirty="0" err="1">
-                <a:solidFill>
-                  <a:srgbClr val="0070C0"/>
-                </a:solidFill>
-              </a:rPr>
-              <a:t>defined</a:t>
-            </a:r>
-            <a:r>
-              <a:rPr lang="pl-PL" sz="2800" dirty="0">
-                <a:solidFill>
-                  <a:srgbClr val="0070C0"/>
-                </a:solidFill>
-              </a:rPr>
-              <a:t>:</a:t>
-            </a:r>
-          </a:p>
-          <a:p>
             <a:pPr marL="457200" indent="-457200">
-              <a:buFontTx/>
-              <a:buChar char="-"/>
+              <a:buFont typeface="Arial" panose="020B0604020202020204" pitchFamily="34" charset="0"/>
+              <a:buChar char="•"/>
             </a:pPr>
-            <a:r>
-              <a:rPr lang="pl-PL" sz="2800" dirty="0" err="1">
-                <a:solidFill>
-                  <a:srgbClr val="0070C0"/>
-                </a:solidFill>
-              </a:rPr>
-              <a:t>inputs</a:t>
-            </a:r>
-            <a:r>
-              <a:rPr lang="pl-PL" sz="2800" dirty="0">
-                <a:solidFill>
-                  <a:srgbClr val="0070C0"/>
-                </a:solidFill>
-              </a:rPr>
-              <a:t> and </a:t>
-            </a:r>
-            <a:r>
-              <a:rPr lang="pl-PL" sz="2800" dirty="0" err="1">
-                <a:solidFill>
-                  <a:srgbClr val="0070C0"/>
-                </a:solidFill>
-              </a:rPr>
-              <a:t>their</a:t>
-            </a:r>
-            <a:r>
-              <a:rPr lang="pl-PL" sz="2800" dirty="0">
-                <a:solidFill>
-                  <a:srgbClr val="0070C0"/>
-                </a:solidFill>
-              </a:rPr>
-              <a:t> </a:t>
-            </a:r>
-            <a:r>
-              <a:rPr lang="pl-PL" sz="2800" dirty="0" err="1">
-                <a:solidFill>
-                  <a:srgbClr val="0070C0"/>
-                </a:solidFill>
-              </a:rPr>
-              <a:t>formats</a:t>
-            </a:r>
-            <a:r>
-              <a:rPr lang="pl-PL" sz="2800" dirty="0">
-                <a:solidFill>
-                  <a:srgbClr val="0070C0"/>
-                </a:solidFill>
-              </a:rPr>
-              <a:t>, </a:t>
-            </a:r>
-          </a:p>
-          <a:p>
-            <a:pPr marL="457200" indent="-457200">
-              <a:buFontTx/>
-              <a:buChar char="-"/>
-            </a:pPr>
-            <a:r>
-              <a:rPr lang="pl-PL" sz="2800" dirty="0" err="1">
-                <a:solidFill>
-                  <a:srgbClr val="0070C0"/>
-                </a:solidFill>
-              </a:rPr>
-              <a:t>behaviour</a:t>
-            </a:r>
-            <a:r>
-              <a:rPr lang="pl-PL" sz="2800" dirty="0">
-                <a:solidFill>
-                  <a:srgbClr val="0070C0"/>
-                </a:solidFill>
-              </a:rPr>
-              <a:t> </a:t>
-            </a:r>
-          </a:p>
-          <a:p>
-            <a:pPr marL="457200" indent="-457200">
-              <a:buFontTx/>
-              <a:buChar char="-"/>
-            </a:pPr>
-            <a:r>
-              <a:rPr lang="pl-PL" sz="2800" dirty="0">
-                <a:solidFill>
-                  <a:srgbClr val="0070C0"/>
-                </a:solidFill>
-              </a:rPr>
-              <a:t>software and system </a:t>
-            </a:r>
-            <a:r>
-              <a:rPr lang="pl-PL" sz="2800" dirty="0" err="1">
-                <a:solidFill>
-                  <a:srgbClr val="0070C0"/>
-                </a:solidFill>
-              </a:rPr>
-              <a:t>dependencies</a:t>
-            </a:r>
             <a:endParaRPr lang="en-GB" sz="2800" dirty="0">
               <a:solidFill>
                 <a:srgbClr val="0070C0"/>
@@ -6546,6 +6397,22 @@
               </a:rPr>
               <a:t>pipeline</a:t>
             </a:r>
+            <a:r>
+              <a:rPr lang="pl-PL" dirty="0">
+                <a:solidFill>
+                  <a:srgbClr val="0070C0"/>
+                </a:solidFill>
+              </a:rPr>
+              <a:t> - </a:t>
+            </a:r>
+            <a:r>
+              <a:rPr lang="pl-PL" dirty="0" err="1">
+                <a:solidFill>
+                  <a:srgbClr val="0070C0"/>
+                </a:solidFill>
+              </a:rPr>
+              <a:t>requirements</a:t>
+            </a:r>
             <a:endParaRPr lang="en-GB" dirty="0">
               <a:solidFill>
                 <a:srgbClr val="0070C0"/>
@@ -6557,7 +6424,7 @@
     </p:spTree>
     <p:extLst>
       <p:ext uri="{BB962C8B-B14F-4D97-AF65-F5344CB8AC3E}">
-        <p14:creationId xmlns:p14="http://schemas.microsoft.com/office/powerpoint/2010/main" val="3894369008"/>
+        <p14:creationId xmlns:p14="http://schemas.microsoft.com/office/powerpoint/2010/main" val="372809105"/>
       </p:ext>
     </p:extLst>
   </p:cSld>
@@ -6612,9 +6479,59 @@
           </a:bodyPr>
           <a:lstStyle/>
           <a:p>
+            <a:r>
+              <a:rPr lang="pl-PL" sz="2800" dirty="0" err="1">
+                <a:solidFill>
+                  <a:srgbClr val="0070C0"/>
+                </a:solidFill>
+              </a:rPr>
+              <a:t>Build</a:t>
+            </a:r>
+            <a:r>
+              <a:rPr lang="pl-PL" sz="2800" dirty="0">
+                <a:solidFill>
+                  <a:srgbClr val="0070C0"/>
+                </a:solidFill>
+              </a:rPr>
+              <a:t> </a:t>
+            </a:r>
+            <a:r>
+              <a:rPr lang="pl-PL" sz="2800" dirty="0" err="1">
+                <a:solidFill>
+                  <a:srgbClr val="0070C0"/>
+                </a:solidFill>
+              </a:rPr>
+              <a:t>it</a:t>
+            </a:r>
+            <a:r>
+              <a:rPr lang="pl-PL" sz="2800" dirty="0">
+                <a:solidFill>
+                  <a:srgbClr val="0070C0"/>
+                </a:solidFill>
+              </a:rPr>
+              <a:t> with </a:t>
+            </a:r>
+            <a:r>
+              <a:rPr lang="pl-PL" sz="2800" dirty="0" err="1">
+                <a:solidFill>
+                  <a:srgbClr val="0070C0"/>
+                </a:solidFill>
+              </a:rPr>
+              <a:t>workflows</a:t>
+            </a:r>
+            <a:r>
+              <a:rPr lang="pl-PL" sz="2800" dirty="0">
+                <a:solidFill>
+                  <a:srgbClr val="0070C0"/>
+                </a:solidFill>
+              </a:rPr>
+              <a:t>:</a:t>
+            </a:r>
+          </a:p>
+          <a:p>
             <a:pPr marL="457200" indent="-457200">
-              <a:buFont typeface="Arial" panose="020B0604020202020204" pitchFamily="34" charset="0"/>
-              <a:buChar char="•"/>
+              <a:buFontTx/>
+              <a:buChar char="-"/>
             </a:pPr>
             <a:r>
               <a:rPr lang="pl-PL" sz="2800" dirty="0" err="1">
@@ -6622,29 +6539,7 @@
                   <a:srgbClr val="0070C0"/>
                 </a:solidFill>
               </a:rPr>
-              <a:t>Easy</a:t>
-            </a:r>
-            <a:r>
-              <a:rPr lang="pl-PL" sz="2800" dirty="0">
-                <a:solidFill>
-                  <a:srgbClr val="0070C0"/>
-                </a:solidFill>
-              </a:rPr>
-              <a:t> to start</a:t>
-            </a:r>
-          </a:p>
-          <a:p>
-            <a:pPr marL="457200" indent="-457200">
-              <a:buFont typeface="Arial" panose="020B0604020202020204" pitchFamily="34" charset="0"/>
-              <a:buChar char="•"/>
-            </a:pPr>
-            <a:r>
-              <a:rPr lang="pl-PL" sz="2800" dirty="0" err="1">
-                <a:solidFill>
-                  <a:srgbClr val="0070C0"/>
-                </a:solidFill>
-              </a:rPr>
-              <a:t>Flexibile</a:t>
+              <a:t>Nextflow</a:t>
             </a:r>
             <a:endParaRPr lang="pl-PL" sz="2800" dirty="0">
               <a:solidFill>
@@ -6654,8 +6549,41 @@
           </a:p>
           <a:p>
             <a:pPr marL="457200" indent="-457200">
-              <a:buFont typeface="Arial" panose="020B0604020202020204" pitchFamily="34" charset="0"/>
-              <a:buChar char="•"/>
+              <a:buFontTx/>
+              <a:buChar char="-"/>
+            </a:pPr>
+            <a:r>
+              <a:rPr lang="pl-PL" sz="2800" dirty="0" err="1">
+                <a:solidFill>
+                  <a:srgbClr val="0070C0"/>
+                </a:solidFill>
+              </a:rPr>
+              <a:t>Snakemake</a:t>
+            </a:r>
+            <a:endParaRPr lang="pl-PL" sz="2800" dirty="0">
+              <a:solidFill>
+                <a:srgbClr val="0070C0"/>
+              </a:solidFill>
+            </a:endParaRPr>
+          </a:p>
+          <a:p>
+            <a:pPr marL="457200" indent="-457200">
+              <a:buFontTx/>
+              <a:buChar char="-"/>
+            </a:pPr>
+            <a:r>
+              <a:rPr lang="pl-PL" sz="2800" dirty="0">
+                <a:solidFill>
+                  <a:srgbClr val="0070C0"/>
+                </a:solidFill>
+              </a:rPr>
+              <a:t>Galaxy</a:t>
+            </a:r>
+          </a:p>
+          <a:p>
+            <a:pPr marL="457200" indent="-457200">
+              <a:buFontTx/>
+              <a:buChar char="-"/>
             </a:pPr>
             <a:endParaRPr lang="pl-PL" sz="2800" dirty="0">
               <a:solidFill>
@@ -6664,9 +6592,43 @@
             </a:endParaRPr>
           </a:p>
           <a:p>
+            <a:r>
+              <a:rPr lang="pl-PL" sz="2800" dirty="0" err="1">
+                <a:solidFill>
+                  <a:srgbClr val="0070C0"/>
+                </a:solidFill>
+              </a:rPr>
+              <a:t>Well</a:t>
+            </a:r>
+            <a:r>
+              <a:rPr lang="pl-PL" sz="2800" dirty="0">
+                <a:solidFill>
+                  <a:srgbClr val="0070C0"/>
+                </a:solidFill>
+              </a:rPr>
+              <a:t> </a:t>
+            </a:r>
+            <a:r>
+              <a:rPr lang="pl-PL" sz="2800" dirty="0" err="1">
+                <a:solidFill>
+                  <a:srgbClr val="0070C0"/>
+                </a:solidFill>
+              </a:rPr>
+              <a:t>defined</a:t>
+            </a:r>
+            <a:r>
+              <a:rPr lang="pl-PL" sz="2800" dirty="0">
+                <a:solidFill>
+                  <a:srgbClr val="0070C0"/>
+                </a:solidFill>
+              </a:rPr>
+              <a:t>:</a:t>
+            </a:r>
+          </a:p>
+          <a:p>
             <a:pPr marL="457200" indent="-457200">
-              <a:buFont typeface="Arial" panose="020B0604020202020204" pitchFamily="34" charset="0"/>
-              <a:buChar char="•"/>
+              <a:buFontTx/>
+              <a:buChar char="-"/>
             </a:pPr>
             <a:r>
               <a:rPr lang="pl-PL" sz="2800" dirty="0" err="1">
@@ -6674,23 +6636,23 @@
                   <a:srgbClr val="0070C0"/>
                 </a:solidFill>
               </a:rPr>
-              <a:t>Easy</a:t>
-            </a:r>
-            <a:r>
-              <a:rPr lang="pl-PL" sz="2800" dirty="0">
-                <a:solidFill>
-                  <a:srgbClr val="0070C0"/>
-                </a:solidFill>
-              </a:rPr>
-              <a:t> to </a:t>
-            </a:r>
-            <a:r>
-              <a:rPr lang="pl-PL" sz="2800" dirty="0" err="1">
-                <a:solidFill>
-                  <a:srgbClr val="0070C0"/>
-                </a:solidFill>
-              </a:rPr>
-              <a:t>pick</a:t>
+              <a:t>inputs</a:t>
+            </a:r>
+            <a:r>
+              <a:rPr lang="pl-PL" sz="2800" dirty="0">
+                <a:solidFill>
+                  <a:srgbClr val="0070C0"/>
+                </a:solidFill>
+              </a:rPr>
+              <a:t> and </a:t>
+            </a:r>
+            <a:r>
+              <a:rPr lang="pl-PL" sz="2800" dirty="0" err="1">
+                <a:solidFill>
+                  <a:srgbClr val="0070C0"/>
+                </a:solidFill>
+              </a:rPr>
+              <a:t>their</a:t>
             </a:r>
             <a:r>
               <a:rPr lang="pl-PL" sz="2800" dirty="0">
@@ -6706,7 +6668,29 @@
                   <a:srgbClr val="0070C0"/>
                 </a:solidFill>
               </a:rPr>
-              <a:t>up</a:t>
+              <a:t>formats</a:t>
+            </a:r>
+            <a:r>
+              <a:rPr lang="pl-PL" sz="2800" dirty="0">
+                <a:solidFill>
+                  <a:srgbClr val="0070C0"/>
+                </a:solidFill>
+              </a:rPr>
+              <a:t>, </a:t>
+            </a:r>
+          </a:p>
+          <a:p>
+            <a:pPr marL="457200" indent="-457200">
+              <a:buFontTx/>
+              <a:buChar char="-"/>
+            </a:pPr>
+            <a:r>
+              <a:rPr lang="pl-PL" sz="2800" dirty="0" err="1">
+                <a:solidFill>
+                  <a:srgbClr val="0070C0"/>
+                </a:solidFill>
+              </a:rPr>
+              <a:t>behaviour</a:t>
             </a:r>
             <a:r>
               <a:rPr lang="pl-PL" sz="2800" dirty="0">
@@ -6716,162 +6700,29 @@
               </a:rPr>
               <a:t> </a:t>
             </a:r>
-            <a:r>
-              <a:rPr lang="pl-PL" sz="2800" dirty="0" err="1">
-                <a:solidFill>
-                  <a:srgbClr val="0070C0"/>
-                </a:solidFill>
-              </a:rPr>
-              <a:t>bad</a:t>
-            </a:r>
-            <a:r>
-              <a:rPr lang="pl-PL" sz="2800" dirty="0">
-                <a:solidFill>
-                  <a:srgbClr val="0070C0"/>
-                </a:solidFill>
-              </a:rPr>
-              <a:t> </a:t>
-            </a:r>
-            <a:r>
-              <a:rPr lang="pl-PL" sz="2800" dirty="0" err="1">
-                <a:solidFill>
-                  <a:srgbClr val="0070C0"/>
-                </a:solidFill>
-              </a:rPr>
-              <a:t>habbits</a:t>
-            </a:r>
-            <a:endParaRPr lang="pl-PL" sz="2800" dirty="0">
-              <a:solidFill>
-                <a:srgbClr val="0070C0"/>
-              </a:solidFill>
-            </a:endParaRPr>
           </a:p>
           <a:p>
             <a:pPr marL="457200" indent="-457200">
-              <a:buFont typeface="Arial" panose="020B0604020202020204" pitchFamily="34" charset="0"/>
-              <a:buChar char="•"/>
+              <a:buFontTx/>
+              <a:buChar char="-"/>
             </a:pPr>
             <a:r>
-              <a:rPr lang="pl-PL" sz="2800" dirty="0" err="1">
-                <a:solidFill>
-                  <a:srgbClr val="0070C0"/>
-                </a:solidFill>
-              </a:rPr>
-              <a:t>Easy</a:t>
-            </a:r>
-            <a:r>
-              <a:rPr lang="pl-PL" sz="2800" dirty="0">
-                <a:solidFill>
-                  <a:srgbClr val="0070C0"/>
-                </a:solidFill>
-              </a:rPr>
-              <a:t> to </a:t>
-            </a:r>
-            <a:r>
-              <a:rPr lang="pl-PL" sz="2800" dirty="0" err="1">
-                <a:solidFill>
-                  <a:srgbClr val="0070C0"/>
-                </a:solidFill>
-              </a:rPr>
-              <a:t>introduce</a:t>
-            </a:r>
-            <a:r>
-              <a:rPr lang="pl-PL" sz="2800" dirty="0">
-                <a:solidFill>
-                  <a:srgbClr val="0070C0"/>
-                </a:solidFill>
-              </a:rPr>
-              <a:t> </a:t>
-            </a:r>
-            <a:r>
-              <a:rPr lang="pl-PL" sz="2800" dirty="0" err="1">
-                <a:solidFill>
-                  <a:srgbClr val="0070C0"/>
-                </a:solidFill>
-              </a:rPr>
-              <a:t>ugly</a:t>
-            </a:r>
-            <a:r>
-              <a:rPr lang="pl-PL" sz="2800" dirty="0">
-                <a:solidFill>
-                  <a:srgbClr val="0070C0"/>
-                </a:solidFill>
-              </a:rPr>
-              <a:t> </a:t>
-            </a:r>
-            <a:r>
-              <a:rPr lang="pl-PL" sz="2800" dirty="0" err="1">
-                <a:solidFill>
-                  <a:srgbClr val="0070C0"/>
-                </a:solidFill>
-              </a:rPr>
-              <a:t>hacks</a:t>
-            </a:r>
-            <a:endParaRPr lang="pl-PL" sz="2800" dirty="0">
-              <a:solidFill>
-                <a:srgbClr val="0070C0"/>
-              </a:solidFill>
-            </a:endParaRPr>
-          </a:p>
-          <a:p>
-            <a:pPr marL="457200" indent="-457200">
-              <a:buFont typeface="Arial" panose="020B0604020202020204" pitchFamily="34" charset="0"/>
-              <a:buChar char="•"/>
-            </a:pPr>
-            <a:endParaRPr lang="pl-PL" sz="2800" dirty="0">
-              <a:solidFill>
-                <a:srgbClr val="0070C0"/>
-              </a:solidFill>
-            </a:endParaRPr>
-          </a:p>
-          <a:p>
-            <a:pPr marL="457200" indent="-457200">
-              <a:buFont typeface="Arial" panose="020B0604020202020204" pitchFamily="34" charset="0"/>
-              <a:buChar char="•"/>
-            </a:pPr>
-            <a:r>
-              <a:rPr lang="pl-PL" sz="2800" dirty="0" err="1">
-                <a:solidFill>
-                  <a:srgbClr val="0070C0"/>
-                </a:solidFill>
-              </a:rPr>
-              <a:t>Beware</a:t>
-            </a:r>
-            <a:r>
-              <a:rPr lang="pl-PL" sz="2800" dirty="0">
-                <a:solidFill>
-                  <a:srgbClr val="0070C0"/>
-                </a:solidFill>
-              </a:rPr>
-              <a:t> spaghetti </a:t>
-            </a:r>
-            <a:r>
-              <a:rPr lang="pl-PL" sz="2800" dirty="0" err="1">
-                <a:solidFill>
-                  <a:srgbClr val="0070C0"/>
-                </a:solidFill>
-              </a:rPr>
-              <a:t>code</a:t>
-            </a:r>
-            <a:endParaRPr lang="pl-PL" sz="2800" dirty="0">
-              <a:solidFill>
-                <a:srgbClr val="0070C0"/>
-              </a:solidFill>
-            </a:endParaRPr>
-          </a:p>
-          <a:p>
-            <a:pPr marL="457200" indent="-457200">
-              <a:buFont typeface="Arial" panose="020B0604020202020204" pitchFamily="34" charset="0"/>
-              <a:buChar char="•"/>
-            </a:pPr>
-            <a:endParaRPr lang="pl-PL" sz="2800" dirty="0">
-              <a:solidFill>
-                <a:srgbClr val="0070C0"/>
-              </a:solidFill>
-            </a:endParaRPr>
-          </a:p>
-          <a:p>
-            <a:endParaRPr lang="pl-PL" sz="2800" dirty="0">
+              <a:rPr lang="pl-PL" sz="2800" dirty="0">
+                <a:solidFill>
+                  <a:srgbClr val="0070C0"/>
+                </a:solidFill>
+              </a:rPr>
+              <a:t>software and system </a:t>
+            </a:r>
+            <a:r>
+              <a:rPr lang="pl-PL" sz="2800" dirty="0" err="1">
+                <a:solidFill>
+                  <a:srgbClr val="0070C0"/>
+                </a:solidFill>
+              </a:rPr>
+              <a:t>dependencies</a:t>
+            </a:r>
+            <a:endParaRPr lang="en-GB" sz="2800" dirty="0">
               <a:solidFill>
                 <a:srgbClr val="0070C0"/>
               </a:solidFill>
@@ -6955,12 +6806,20 @@
           <a:lstStyle/>
           <a:p>
             <a:r>
+              <a:rPr lang="pl-PL" dirty="0" err="1">
+                <a:solidFill>
+                  <a:srgbClr val="0070C0"/>
+                </a:solidFill>
+              </a:rPr>
+              <a:t>Reusable</a:t>
+            </a:r>
+            <a:r>
               <a:rPr lang="pl-PL" dirty="0">
                 <a:solidFill>
                   <a:srgbClr val="0070C0"/>
                 </a:solidFill>
               </a:rPr>
-              <a:t>Computing in R and </a:t>
+              <a:t> </a:t>
             </a:r>
             <a:r>
               <a:rPr lang="pl-PL" dirty="0" err="1">
@@ -6968,7 +6827,7 @@
                   <a:srgbClr val="0070C0"/>
                 </a:solidFill>
               </a:rPr>
-              <a:t>Python</a:t>
+              <a:t>pipeline</a:t>
             </a:r>
             <a:endParaRPr lang="en-GB" dirty="0">
               <a:solidFill>
@@ -6981,7 +6840,7 @@
     </p:spTree>
     <p:extLst>
       <p:ext uri="{BB962C8B-B14F-4D97-AF65-F5344CB8AC3E}">
-        <p14:creationId xmlns:p14="http://schemas.microsoft.com/office/powerpoint/2010/main" val="2592532412"/>
+        <p14:creationId xmlns:p14="http://schemas.microsoft.com/office/powerpoint/2010/main" val="3894369008"/>
       </p:ext>
     </p:extLst>
   </p:cSld>
@@ -7023,7 +6882,7 @@
         <p:spPr>
           <a:xfrm>
             <a:off x="1138104" y="1569406"/>
-            <a:ext cx="9464530" cy="3108543"/>
+            <a:ext cx="9464530" cy="3970318"/>
           </a:xfrm>
           <a:prstGeom prst="rect">
             <a:avLst/>
@@ -7036,21 +6895,39 @@
           </a:bodyPr>
           <a:lstStyle/>
           <a:p>
-            <a:r>
-              <a:rPr lang="pl-PL" sz="2800" dirty="0">
-                <a:solidFill>
-                  <a:srgbClr val="0070C0"/>
-                </a:solidFill>
-              </a:rPr>
-              <a:t>We </a:t>
-            </a:r>
-            <a:r>
-              <a:rPr lang="pl-PL" sz="2800" dirty="0" smtClean="0">
-                <a:solidFill>
-                  <a:srgbClr val="0070C0"/>
-                </a:solidFill>
-              </a:rPr>
-              <a:t>recommend:</a:t>
+            <a:pPr marL="457200" indent="-457200">
+              <a:buFont typeface="Arial" panose="020B0604020202020204" pitchFamily="34" charset="0"/>
+              <a:buChar char="•"/>
+            </a:pPr>
+            <a:r>
+              <a:rPr lang="pl-PL" sz="2800" dirty="0" err="1">
+                <a:solidFill>
+                  <a:srgbClr val="0070C0"/>
+                </a:solidFill>
+              </a:rPr>
+              <a:t>Easy</a:t>
+            </a:r>
+            <a:r>
+              <a:rPr lang="pl-PL" sz="2800" dirty="0">
+                <a:solidFill>
+                  <a:srgbClr val="0070C0"/>
+                </a:solidFill>
+              </a:rPr>
+              <a:t> to start</a:t>
+            </a:r>
+          </a:p>
+          <a:p>
+            <a:pPr marL="457200" indent="-457200">
+              <a:buFont typeface="Arial" panose="020B0604020202020204" pitchFamily="34" charset="0"/>
+              <a:buChar char="•"/>
+            </a:pPr>
+            <a:r>
+              <a:rPr lang="pl-PL" sz="2800" dirty="0" err="1">
+                <a:solidFill>
+                  <a:srgbClr val="0070C0"/>
+                </a:solidFill>
+              </a:rPr>
+              <a:t>Flexibile</a:t>
             </a:r>
             <a:endParaRPr lang="pl-PL" sz="2800" dirty="0">
               <a:solidFill>
@@ -7063,22 +6940,11 @@
               <a:buFont typeface="Arial" panose="020B0604020202020204" pitchFamily="34" charset="0"/>
               <a:buChar char="•"/>
             </a:pPr>
-            <a:r>
-              <a:rPr lang="en-GB" sz="2800" dirty="0" smtClean="0">
-                <a:solidFill>
-                  <a:srgbClr val="0070C0"/>
-                </a:solidFill>
-              </a:rPr>
-              <a:t>Firstly</a:t>
-            </a:r>
-            <a:r>
-              <a:rPr lang="en-GB" sz="2800" dirty="0">
-                <a:solidFill>
-                  <a:srgbClr val="0070C0"/>
-                </a:solidFill>
-              </a:rPr>
-              <a:t>, learn how to make simple plots, clean/reorganize files and data tables</a:t>
-            </a:r>
+            <a:endParaRPr lang="pl-PL" sz="2800" dirty="0">
+              <a:solidFill>
+                <a:srgbClr val="0070C0"/>
+              </a:solidFill>
+            </a:endParaRPr>
           </a:p>
           <a:p>
             <a:pPr marL="457200" indent="-457200">
@@ -7086,21 +6952,82 @@
               <a:buChar char="•"/>
             </a:pPr>
             <a:r>
-              <a:rPr lang="en-GB" sz="2800" dirty="0" smtClean="0">
-                <a:solidFill>
-                  <a:srgbClr val="0070C0"/>
-                </a:solidFill>
-              </a:rPr>
-              <a:t>Secondly</a:t>
-            </a:r>
-            <a:r>
-              <a:rPr lang="en-GB" sz="2800" dirty="0">
-                <a:solidFill>
-                  <a:srgbClr val="0070C0"/>
-                </a:solidFill>
-              </a:rPr>
-              <a:t>, learn basics of software engineering and good programming practices</a:t>
-            </a:r>
+              <a:rPr lang="pl-PL" sz="2800" dirty="0" err="1">
+                <a:solidFill>
+                  <a:srgbClr val="0070C0"/>
+                </a:solidFill>
+              </a:rPr>
+              <a:t>Easy</a:t>
+            </a:r>
+            <a:r>
+              <a:rPr lang="pl-PL" sz="2800" dirty="0">
+                <a:solidFill>
+                  <a:srgbClr val="0070C0"/>
+                </a:solidFill>
+              </a:rPr>
+              <a:t> to </a:t>
+            </a:r>
+            <a:r>
+              <a:rPr lang="pl-PL" sz="2800" dirty="0" err="1">
+                <a:solidFill>
+                  <a:srgbClr val="0070C0"/>
+                </a:solidFill>
+              </a:rPr>
+              <a:t>pick</a:t>
+            </a:r>
+            <a:r>
+              <a:rPr lang="pl-PL" sz="2800" dirty="0">
+                <a:solidFill>
+                  <a:srgbClr val="0070C0"/>
+                </a:solidFill>
+              </a:rPr>
+              <a:t> </a:t>
+            </a:r>
+            <a:r>
+              <a:rPr lang="pl-PL" sz="2800" dirty="0" err="1">
+                <a:solidFill>
+                  <a:srgbClr val="0070C0"/>
+                </a:solidFill>
+              </a:rPr>
+              <a:t>up</a:t>
+            </a:r>
+            <a:r>
+              <a:rPr lang="pl-PL" sz="2800" dirty="0">
+                <a:solidFill>
+                  <a:srgbClr val="0070C0"/>
+                </a:solidFill>
+              </a:rPr>
+              <a:t> </a:t>
+            </a:r>
+            <a:r>
+              <a:rPr lang="pl-PL" sz="2800" dirty="0" err="1">
+                <a:solidFill>
+                  <a:srgbClr val="0070C0"/>
+                </a:solidFill>
+              </a:rPr>
+              <a:t>bad</a:t>
+            </a:r>
+            <a:r>
+              <a:rPr lang="pl-PL" sz="2800" dirty="0">
+                <a:solidFill>
+                  <a:srgbClr val="0070C0"/>
+                </a:solidFill>
+              </a:rPr>
+              <a:t> </a:t>
+            </a:r>
+            <a:r>
+              <a:rPr lang="pl-PL" sz="2800" dirty="0" err="1">
+                <a:solidFill>
+                  <a:srgbClr val="0070C0"/>
+                </a:solidFill>
+              </a:rPr>
+              <a:t>habbits</a:t>
+            </a:r>
+            <a:endParaRPr lang="pl-PL" sz="2800" dirty="0">
+              <a:solidFill>
+                <a:srgbClr val="0070C0"/>
+              </a:solidFill>
+            </a:endParaRPr>
           </a:p>
           <a:p>
             <a:pPr marL="457200" indent="-457200">
@@ -7108,21 +7035,125 @@
               <a:buChar char="•"/>
             </a:pPr>
             <a:r>
-              <a:rPr lang="en-GB" sz="2800" dirty="0" smtClean="0">
-                <a:solidFill>
-                  <a:srgbClr val="0070C0"/>
-                </a:solidFill>
-              </a:rPr>
-              <a:t>Then </a:t>
-            </a:r>
-            <a:r>
-              <a:rPr lang="en-GB" sz="2800" dirty="0">
-                <a:solidFill>
-                  <a:srgbClr val="0070C0"/>
-                </a:solidFill>
-              </a:rPr>
-              <a:t>start coding advanced analysis and processing, construct pipelines with workflows</a:t>
-            </a:r>
+              <a:rPr lang="pl-PL" sz="2800" dirty="0" err="1">
+                <a:solidFill>
+                  <a:srgbClr val="0070C0"/>
+                </a:solidFill>
+              </a:rPr>
+              <a:t>Easy</a:t>
+            </a:r>
+            <a:r>
+              <a:rPr lang="pl-PL" sz="2800" dirty="0">
+                <a:solidFill>
+                  <a:srgbClr val="0070C0"/>
+                </a:solidFill>
+              </a:rPr>
+              <a:t> to </a:t>
+            </a:r>
+            <a:r>
+              <a:rPr lang="pl-PL" sz="2800" dirty="0" err="1">
+                <a:solidFill>
+                  <a:srgbClr val="0070C0"/>
+                </a:solidFill>
+              </a:rPr>
+              <a:t>introduce</a:t>
+            </a:r>
+            <a:r>
+              <a:rPr lang="pl-PL" sz="2800" dirty="0">
+                <a:solidFill>
+                  <a:srgbClr val="0070C0"/>
+                </a:solidFill>
+              </a:rPr>
+              <a:t> </a:t>
+            </a:r>
+            <a:r>
+              <a:rPr lang="pl-PL" sz="2800" dirty="0" err="1">
+                <a:solidFill>
+                  <a:srgbClr val="0070C0"/>
+                </a:solidFill>
+              </a:rPr>
+              <a:t>ugly</a:t>
+            </a:r>
+            <a:r>
+              <a:rPr lang="pl-PL" sz="2800" dirty="0">
+                <a:solidFill>
+                  <a:srgbClr val="0070C0"/>
+                </a:solidFill>
+              </a:rPr>
+              <a:t> </a:t>
+            </a:r>
+            <a:r>
+              <a:rPr lang="pl-PL" sz="2800" dirty="0" err="1">
+                <a:solidFill>
+                  <a:srgbClr val="0070C0"/>
+                </a:solidFill>
+              </a:rPr>
+              <a:t>hacks</a:t>
+            </a:r>
+            <a:endParaRPr lang="pl-PL" sz="2800" dirty="0">
+              <a:solidFill>
+                <a:srgbClr val="0070C0"/>
+              </a:solidFill>
+            </a:endParaRPr>
+          </a:p>
+          <a:p>
+            <a:pPr marL="457200" indent="-457200">
+              <a:buFont typeface="Arial" panose="020B0604020202020204" pitchFamily="34" charset="0"/>
+              <a:buChar char="•"/>
+            </a:pPr>
+            <a:endParaRPr lang="pl-PL" sz="2800" dirty="0">
+              <a:solidFill>
+                <a:srgbClr val="0070C0"/>
+              </a:solidFill>
+            </a:endParaRPr>
+          </a:p>
+          <a:p>
+            <a:pPr marL="457200" indent="-457200">
+              <a:buFont typeface="Arial" panose="020B0604020202020204" pitchFamily="34" charset="0"/>
+              <a:buChar char="•"/>
+            </a:pPr>
+            <a:r>
+              <a:rPr lang="pl-PL" sz="2800" dirty="0" err="1">
+                <a:solidFill>
+                  <a:srgbClr val="0070C0"/>
+                </a:solidFill>
+              </a:rPr>
+              <a:t>Beware</a:t>
+            </a:r>
+            <a:r>
+              <a:rPr lang="pl-PL" sz="2800" dirty="0">
+                <a:solidFill>
+                  <a:srgbClr val="0070C0"/>
+                </a:solidFill>
+              </a:rPr>
+              <a:t> spaghetti </a:t>
+            </a:r>
+            <a:r>
+              <a:rPr lang="pl-PL" sz="2800" dirty="0" err="1">
+                <a:solidFill>
+                  <a:srgbClr val="0070C0"/>
+                </a:solidFill>
+              </a:rPr>
+              <a:t>code</a:t>
+            </a:r>
+            <a:endParaRPr lang="pl-PL" sz="2800" dirty="0">
+              <a:solidFill>
+                <a:srgbClr val="0070C0"/>
+              </a:solidFill>
+            </a:endParaRPr>
+          </a:p>
+          <a:p>
+            <a:pPr marL="457200" indent="-457200">
+              <a:buFont typeface="Arial" panose="020B0604020202020204" pitchFamily="34" charset="0"/>
+              <a:buChar char="•"/>
+            </a:pPr>
+            <a:endParaRPr lang="pl-PL" sz="2800" dirty="0">
+              <a:solidFill>
+                <a:srgbClr val="0070C0"/>
+              </a:solidFill>
+            </a:endParaRPr>
+          </a:p>
+          <a:p>
             <a:endParaRPr lang="pl-PL" sz="2800" dirty="0">
               <a:solidFill>
                 <a:srgbClr val="0070C0"/>
@@ -7233,7 +7264,7 @@
     </p:spTree>
     <p:extLst>
       <p:ext uri="{BB962C8B-B14F-4D97-AF65-F5344CB8AC3E}">
-        <p14:creationId xmlns:p14="http://schemas.microsoft.com/office/powerpoint/2010/main" val="2618220604"/>
+        <p14:creationId xmlns:p14="http://schemas.microsoft.com/office/powerpoint/2010/main" val="2592532412"/>
       </p:ext>
     </p:extLst>
   </p:cSld>
@@ -7275,7 +7306,7 @@
         <p:spPr>
           <a:xfrm>
             <a:off x="1138104" y="1569406"/>
-            <a:ext cx="9464530" cy="2246769"/>
+            <a:ext cx="9464530" cy="3108543"/>
           </a:xfrm>
           <a:prstGeom prst="rect">
             <a:avLst/>
@@ -7294,122 +7325,16 @@
                   <a:srgbClr val="0070C0"/>
                 </a:solidFill>
               </a:rPr>
-              <a:t>R and </a:t>
-            </a:r>
-            <a:r>
-              <a:rPr lang="pl-PL" sz="2800" dirty="0" err="1">
-                <a:solidFill>
-                  <a:srgbClr val="0070C0"/>
-                </a:solidFill>
-              </a:rPr>
-              <a:t>Python</a:t>
-            </a:r>
-            <a:r>
-              <a:rPr lang="pl-PL" sz="2800" dirty="0">
-                <a:solidFill>
-                  <a:srgbClr val="0070C0"/>
-                </a:solidFill>
-              </a:rPr>
-              <a:t> </a:t>
-            </a:r>
-            <a:r>
-              <a:rPr lang="pl-PL" sz="2800" dirty="0" err="1">
-                <a:solidFill>
-                  <a:srgbClr val="0070C0"/>
-                </a:solidFill>
-              </a:rPr>
-              <a:t>behaviour</a:t>
-            </a:r>
-            <a:r>
-              <a:rPr lang="pl-PL" sz="2800" dirty="0">
-                <a:solidFill>
-                  <a:srgbClr val="0070C0"/>
-                </a:solidFill>
-              </a:rPr>
-              <a:t> </a:t>
-            </a:r>
-            <a:r>
-              <a:rPr lang="pl-PL" sz="2800" dirty="0" err="1">
-                <a:solidFill>
-                  <a:srgbClr val="0070C0"/>
-                </a:solidFill>
-              </a:rPr>
-              <a:t>depends</a:t>
-            </a:r>
-            <a:r>
-              <a:rPr lang="pl-PL" sz="2800" dirty="0">
-                <a:solidFill>
-                  <a:srgbClr val="0070C0"/>
-                </a:solidFill>
-              </a:rPr>
-              <a:t> on </a:t>
-            </a:r>
-            <a:r>
-              <a:rPr lang="pl-PL" sz="2800" dirty="0" err="1">
-                <a:solidFill>
-                  <a:srgbClr val="0070C0"/>
-                </a:solidFill>
-              </a:rPr>
-              <a:t>what</a:t>
-            </a:r>
-            <a:r>
-              <a:rPr lang="pl-PL" sz="2800" dirty="0">
-                <a:solidFill>
-                  <a:srgbClr val="0070C0"/>
-                </a:solidFill>
-              </a:rPr>
-              <a:t> </a:t>
-            </a:r>
-            <a:r>
-              <a:rPr lang="pl-PL" sz="2800" dirty="0" err="1">
-                <a:solidFill>
-                  <a:srgbClr val="0070C0"/>
-                </a:solidFill>
-              </a:rPr>
-              <a:t>is</a:t>
-            </a:r>
-            <a:r>
-              <a:rPr lang="pl-PL" sz="2800" dirty="0">
-                <a:solidFill>
-                  <a:srgbClr val="0070C0"/>
-                </a:solidFill>
-              </a:rPr>
-              <a:t> </a:t>
-            </a:r>
-            <a:r>
-              <a:rPr lang="pl-PL" sz="2800" dirty="0" err="1">
-                <a:solidFill>
-                  <a:srgbClr val="0070C0"/>
-                </a:solidFill>
-              </a:rPr>
-              <a:t>installed</a:t>
-            </a:r>
-            <a:r>
-              <a:rPr lang="pl-PL" sz="2800" dirty="0">
-                <a:solidFill>
-                  <a:srgbClr val="0070C0"/>
-                </a:solidFill>
-              </a:rPr>
-              <a:t> in </a:t>
-            </a:r>
-            <a:r>
-              <a:rPr lang="pl-PL" sz="2800" dirty="0" err="1">
-                <a:solidFill>
-                  <a:srgbClr val="0070C0"/>
-                </a:solidFill>
-              </a:rPr>
-              <a:t>your</a:t>
-            </a:r>
-            <a:r>
-              <a:rPr lang="pl-PL" sz="2800" dirty="0">
-                <a:solidFill>
-                  <a:srgbClr val="0070C0"/>
-                </a:solidFill>
-              </a:rPr>
-              <a:t> system</a:t>
-            </a:r>
-          </a:p>
-          <a:p>
+              <a:t>We </a:t>
+            </a:r>
+            <a:r>
+              <a:rPr lang="pl-PL" sz="2800" dirty="0" smtClean="0">
+                <a:solidFill>
+                  <a:srgbClr val="0070C0"/>
+                </a:solidFill>
+              </a:rPr>
+              <a:t>recommend:</a:t>
+            </a:r>
             <a:endParaRPr lang="pl-PL" sz="2800" dirty="0">
               <a:solidFill>
                 <a:srgbClr val="0070C0"/>
@@ -7417,85 +7342,75 @@
             </a:endParaRPr>
           </a:p>
           <a:p>
+            <a:pPr marL="457200" indent="-457200">
+              <a:buFont typeface="Arial" panose="020B0604020202020204" pitchFamily="34" charset="0"/>
+              <a:buChar char="•"/>
+            </a:pPr>
+            <a:r>
+              <a:rPr lang="en-GB" sz="2800" dirty="0" smtClean="0">
+                <a:solidFill>
+                  <a:srgbClr val="0070C0"/>
+                </a:solidFill>
+              </a:rPr>
+              <a:t>Firstly</a:t>
+            </a:r>
+            <a:r>
+              <a:rPr lang="en-GB" sz="2800" dirty="0">
+                <a:solidFill>
+                  <a:srgbClr val="0070C0"/>
+                </a:solidFill>
+              </a:rPr>
+              <a:t>, learn how to make simple plots, clean/reorganize files and data tables</a:t>
+            </a:r>
+          </a:p>
+          <a:p>
+            <a:pPr marL="457200" indent="-457200">
+              <a:buFont typeface="Arial" panose="020B0604020202020204" pitchFamily="34" charset="0"/>
+              <a:buChar char="•"/>
+            </a:pPr>
+            <a:r>
+              <a:rPr lang="en-GB" sz="2800" dirty="0" smtClean="0">
+                <a:solidFill>
+                  <a:srgbClr val="0070C0"/>
+                </a:solidFill>
+              </a:rPr>
+              <a:t>Secondly</a:t>
+            </a:r>
+            <a:r>
+              <a:rPr lang="en-GB" sz="2800" dirty="0">
+                <a:solidFill>
+                  <a:srgbClr val="0070C0"/>
+                </a:solidFill>
+              </a:rPr>
+              <a:t>, learn basics of software engineering and good programming practices</a:t>
+            </a:r>
+          </a:p>
+          <a:p>
+            <a:pPr marL="457200" indent="-457200">
+              <a:buFont typeface="Arial" panose="020B0604020202020204" pitchFamily="34" charset="0"/>
+              <a:buChar char="•"/>
+            </a:pPr>
+            <a:r>
+              <a:rPr lang="en-GB" sz="2800" dirty="0" smtClean="0">
+                <a:solidFill>
+                  <a:srgbClr val="0070C0"/>
+                </a:solidFill>
+              </a:rPr>
+              <a:t>Then </a:t>
+            </a:r>
+            <a:r>
+              <a:rPr lang="en-GB" sz="2800" dirty="0">
+                <a:solidFill>
+                  <a:srgbClr val="0070C0"/>
+                </a:solidFill>
+              </a:rPr>
+              <a:t>start coding advanced analysis and processing, construct pipelines with workflows</a:t>
+            </a:r>
             <a:endParaRPr lang="pl-PL" sz="2800" dirty="0">
               <a:solidFill>
                 <a:srgbClr val="0070C0"/>
               </a:solidFill>
             </a:endParaRPr>
-          </a:p>
-          <a:p>
-            <a:r>
-              <a:rPr lang="pl-PL" sz="2800" i="1" dirty="0">
-                <a:solidFill>
-                  <a:srgbClr val="0070C0"/>
-                </a:solidFill>
-              </a:rPr>
-              <a:t>„… but </a:t>
-            </a:r>
-            <a:r>
-              <a:rPr lang="pl-PL" sz="2800" i="1" dirty="0" err="1">
-                <a:solidFill>
-                  <a:srgbClr val="0070C0"/>
-                </a:solidFill>
-              </a:rPr>
-              <a:t>it</a:t>
-            </a:r>
-            <a:r>
-              <a:rPr lang="pl-PL" sz="2800" i="1" dirty="0">
-                <a:solidFill>
-                  <a:srgbClr val="0070C0"/>
-                </a:solidFill>
-              </a:rPr>
-              <a:t> </a:t>
-            </a:r>
-            <a:r>
-              <a:rPr lang="pl-PL" sz="2800" i="1" dirty="0" err="1">
-                <a:solidFill>
-                  <a:srgbClr val="0070C0"/>
-                </a:solidFill>
-              </a:rPr>
-              <a:t>works</a:t>
-            </a:r>
-            <a:r>
-              <a:rPr lang="pl-PL" sz="2800" i="1" dirty="0">
-                <a:solidFill>
-                  <a:srgbClr val="0070C0"/>
-                </a:solidFill>
-              </a:rPr>
-              <a:t> (</a:t>
-            </a:r>
-            <a:r>
-              <a:rPr lang="pl-PL" sz="2800" i="1" dirty="0" err="1">
-                <a:solidFill>
-                  <a:srgbClr val="0070C0"/>
-                </a:solidFill>
-              </a:rPr>
-              <a:t>only</a:t>
-            </a:r>
-            <a:r>
-              <a:rPr lang="pl-PL" sz="2800" i="1" dirty="0">
-                <a:solidFill>
-                  <a:srgbClr val="0070C0"/>
-                </a:solidFill>
-              </a:rPr>
-              <a:t>) on my </a:t>
-            </a:r>
-            <a:r>
-              <a:rPr lang="pl-PL" sz="2800" i="1" dirty="0" err="1">
-                <a:solidFill>
-                  <a:srgbClr val="0070C0"/>
-                </a:solidFill>
-              </a:rPr>
-              <a:t>machine</a:t>
-            </a:r>
-            <a:r>
-              <a:rPr lang="pl-PL" sz="2800" i="1" dirty="0">
-                <a:solidFill>
-                  <a:srgbClr val="0070C0"/>
-                </a:solidFill>
-              </a:rPr>
-              <a:t>”</a:t>
-            </a:r>
           </a:p>
         </p:txBody>
       </p:sp>
@@ -7601,7 +7516,7 @@
     </p:spTree>
     <p:extLst>
       <p:ext uri="{BB962C8B-B14F-4D97-AF65-F5344CB8AC3E}">
-        <p14:creationId xmlns:p14="http://schemas.microsoft.com/office/powerpoint/2010/main" val="3591889222"/>
+        <p14:creationId xmlns:p14="http://schemas.microsoft.com/office/powerpoint/2010/main" val="2618220604"/>
       </p:ext>
     </p:extLst>
   </p:cSld>
@@ -7643,7 +7558,7 @@
         <p:spPr>
           <a:xfrm>
             <a:off x="1138104" y="1569406"/>
-            <a:ext cx="9682566" cy="4832092"/>
+            <a:ext cx="9464530" cy="2246769"/>
           </a:xfrm>
           <a:prstGeom prst="rect">
             <a:avLst/>
@@ -7785,56 +7700,6 @@
             </a:endParaRPr>
           </a:p>
           <a:p>
-            <a:r>
-              <a:rPr lang="pl-PL" sz="2800" dirty="0" err="1">
-                <a:solidFill>
-                  <a:srgbClr val="0070C0"/>
-                </a:solidFill>
-              </a:rPr>
-              <a:t>Conda</a:t>
-            </a:r>
-            <a:r>
-              <a:rPr lang="pl-PL" sz="2800" dirty="0">
-                <a:solidFill>
-                  <a:srgbClr val="0070C0"/>
-                </a:solidFill>
-              </a:rPr>
-              <a:t> </a:t>
-            </a:r>
-            <a:r>
-              <a:rPr lang="pl-PL" sz="2800" dirty="0" err="1">
-                <a:solidFill>
-                  <a:srgbClr val="0070C0"/>
-                </a:solidFill>
-              </a:rPr>
-              <a:t>is</a:t>
-            </a:r>
-            <a:r>
-              <a:rPr lang="pl-PL" sz="2800" dirty="0">
-                <a:solidFill>
-                  <a:srgbClr val="0070C0"/>
-                </a:solidFill>
-              </a:rPr>
-              <a:t> a </a:t>
-            </a:r>
-            <a:r>
-              <a:rPr lang="pl-PL" sz="2800" dirty="0" err="1">
-                <a:solidFill>
-                  <a:srgbClr val="0070C0"/>
-                </a:solidFill>
-              </a:rPr>
-              <a:t>package</a:t>
-            </a:r>
-            <a:r>
-              <a:rPr lang="pl-PL" sz="2800" dirty="0">
-                <a:solidFill>
-                  <a:srgbClr val="0070C0"/>
-                </a:solidFill>
-              </a:rPr>
-              <a:t> management system for Win, Mac OS, Linux.</a:t>
-            </a:r>
-          </a:p>
-          <a:p>
             <a:endParaRPr lang="pl-PL" sz="2800" dirty="0">
               <a:solidFill>
                 <a:srgbClr val="0070C0"/>
@@ -7843,15 +7708,23 @@
           </a:p>
           <a:p>
             <a:r>
-              <a:rPr lang="pl-PL" sz="2800" dirty="0" err="1">
-                <a:solidFill>
-                  <a:srgbClr val="0070C0"/>
-                </a:solidFill>
-              </a:rPr>
-              <a:t>Conda</a:t>
-            </a:r>
-            <a:r>
-              <a:rPr lang="pl-PL" sz="2800" dirty="0">
+              <a:rPr lang="pl-PL" sz="2800" i="1" dirty="0">
+                <a:solidFill>
+                  <a:srgbClr val="0070C0"/>
+                </a:solidFill>
+              </a:rPr>
+              <a:t>„… but </a:t>
+            </a:r>
+            <a:r>
+              <a:rPr lang="pl-PL" sz="2800" i="1" dirty="0" err="1">
+                <a:solidFill>
+                  <a:srgbClr val="0070C0"/>
+                </a:solidFill>
+              </a:rPr>
+              <a:t>it</a:t>
+            </a:r>
+            <a:r>
+              <a:rPr lang="pl-PL" sz="2800" i="1" dirty="0">
                 <a:solidFill>
                   <a:srgbClr val="0070C0"/>
                 </a:solidFill>
@@ -7859,310 +7732,52 @@
               <a:t> </a:t>
             </a:r>
             <a:r>
-              <a:rPr lang="pl-PL" sz="2800" dirty="0" err="1">
-                <a:solidFill>
-                  <a:srgbClr val="0070C0"/>
-                </a:solidFill>
-              </a:rPr>
-              <a:t>install</a:t>
-            </a:r>
-            <a:r>
-              <a:rPr lang="pl-PL" sz="2800" dirty="0">
-                <a:solidFill>
-                  <a:srgbClr val="0070C0"/>
-                </a:solidFill>
-              </a:rPr>
-              <a:t>, run, and update </a:t>
-            </a:r>
-            <a:r>
-              <a:rPr lang="pl-PL" sz="2800" dirty="0" err="1">
-                <a:solidFill>
-                  <a:srgbClr val="0070C0"/>
-                </a:solidFill>
-              </a:rPr>
-              <a:t>packages</a:t>
-            </a:r>
-            <a:r>
-              <a:rPr lang="pl-PL" sz="2800" dirty="0">
-                <a:solidFill>
-                  <a:srgbClr val="0070C0"/>
-                </a:solidFill>
-              </a:rPr>
-              <a:t> and </a:t>
-            </a:r>
-            <a:r>
-              <a:rPr lang="pl-PL" sz="2800" dirty="0" err="1">
-                <a:solidFill>
-                  <a:srgbClr val="0070C0"/>
-                </a:solidFill>
-              </a:rPr>
-              <a:t>their</a:t>
-            </a:r>
-            <a:r>
-              <a:rPr lang="pl-PL" sz="2800" dirty="0">
-                <a:solidFill>
-                  <a:srgbClr val="0070C0"/>
-                </a:solidFill>
-              </a:rPr>
-              <a:t> </a:t>
-            </a:r>
-            <a:r>
-              <a:rPr lang="pl-PL" sz="2800" dirty="0" err="1">
-                <a:solidFill>
-                  <a:srgbClr val="0070C0"/>
-                </a:solidFill>
-              </a:rPr>
-              <a:t>dependencies</a:t>
-            </a:r>
-            <a:r>
-              <a:rPr lang="pl-PL" sz="2800" dirty="0">
-                <a:solidFill>
-                  <a:srgbClr val="0070C0"/>
-                </a:solidFill>
-              </a:rPr>
-              <a:t>.</a:t>
-            </a:r>
-          </a:p>
-          <a:p>
-            <a:endParaRPr lang="pl-PL" sz="2800" dirty="0">
-              <a:solidFill>
-                <a:srgbClr val="0070C0"/>
-              </a:solidFill>
-            </a:endParaRPr>
-          </a:p>
-          <a:p>
-            <a:r>
-              <a:rPr lang="pl-PL" sz="2800" dirty="0" err="1">
-                <a:solidFill>
-                  <a:srgbClr val="0070C0"/>
-                </a:solidFill>
-              </a:rPr>
-              <a:t>Conda</a:t>
-            </a:r>
-            <a:r>
-              <a:rPr lang="pl-PL" sz="2800" dirty="0">
-                <a:solidFill>
-                  <a:srgbClr val="0070C0"/>
-                </a:solidFill>
-              </a:rPr>
-              <a:t> </a:t>
-            </a:r>
-            <a:r>
-              <a:rPr lang="pl-PL" sz="2800" dirty="0" err="1">
-                <a:solidFill>
-                  <a:srgbClr val="0070C0"/>
-                </a:solidFill>
-              </a:rPr>
-              <a:t>can</a:t>
-            </a:r>
-            <a:r>
-              <a:rPr lang="pl-PL" sz="2800" dirty="0">
-                <a:solidFill>
-                  <a:srgbClr val="0070C0"/>
-                </a:solidFill>
-              </a:rPr>
-              <a:t> </a:t>
-            </a:r>
-            <a:r>
-              <a:rPr lang="pl-PL" sz="2800" dirty="0" err="1">
-                <a:solidFill>
-                  <a:srgbClr val="0070C0"/>
-                </a:solidFill>
-              </a:rPr>
-              <a:t>switch</a:t>
-            </a:r>
-            <a:r>
-              <a:rPr lang="pl-PL" sz="2800" dirty="0">
-                <a:solidFill>
-                  <a:srgbClr val="0070C0"/>
-                </a:solidFill>
-              </a:rPr>
-              <a:t> </a:t>
-            </a:r>
-            <a:r>
-              <a:rPr lang="pl-PL" sz="2800" dirty="0" err="1">
-                <a:solidFill>
-                  <a:srgbClr val="0070C0"/>
-                </a:solidFill>
-              </a:rPr>
-              <a:t>between</a:t>
-            </a:r>
-            <a:r>
-              <a:rPr lang="pl-PL" sz="2800" dirty="0">
-                <a:solidFill>
-                  <a:srgbClr val="0070C0"/>
-                </a:solidFill>
-              </a:rPr>
-              <a:t> </a:t>
-            </a:r>
-            <a:r>
-              <a:rPr lang="pl-PL" sz="2800" dirty="0" err="1">
-                <a:solidFill>
-                  <a:srgbClr val="0070C0"/>
-                </a:solidFill>
-              </a:rPr>
-              <a:t>project</a:t>
-            </a:r>
-            <a:r>
-              <a:rPr lang="pl-PL" sz="2800" dirty="0">
-                <a:solidFill>
-                  <a:srgbClr val="0070C0"/>
-                </a:solidFill>
-              </a:rPr>
-              <a:t> </a:t>
-            </a:r>
-            <a:r>
-              <a:rPr lang="pl-PL" sz="2800" dirty="0" err="1">
-                <a:solidFill>
-                  <a:srgbClr val="0070C0"/>
-                </a:solidFill>
-              </a:rPr>
-              <a:t>environments</a:t>
-            </a:r>
-            <a:r>
-              <a:rPr lang="pl-PL" sz="2800" dirty="0">
-                <a:solidFill>
-                  <a:srgbClr val="0070C0"/>
-                </a:solidFill>
-              </a:rPr>
-              <a:t>.</a:t>
-            </a:r>
-          </a:p>
-          <a:p>
-            <a:endParaRPr lang="pl-PL" sz="2800" dirty="0">
-              <a:solidFill>
-                <a:srgbClr val="0070C0"/>
-              </a:solidFill>
-            </a:endParaRPr>
-          </a:p>
-          <a:p>
-            <a:r>
-              <a:rPr lang="pl-PL" sz="2800" dirty="0" err="1">
-                <a:solidFill>
-                  <a:srgbClr val="0070C0"/>
-                </a:solidFill>
-              </a:rPr>
-              <a:t>Conda</a:t>
-            </a:r>
-            <a:r>
-              <a:rPr lang="pl-PL" sz="2800" dirty="0">
-                <a:solidFill>
-                  <a:srgbClr val="0070C0"/>
-                </a:solidFill>
-              </a:rPr>
-              <a:t> suport </a:t>
-            </a:r>
-            <a:r>
-              <a:rPr lang="pl-PL" sz="2800" dirty="0" err="1">
-                <a:solidFill>
-                  <a:srgbClr val="0070C0"/>
-                </a:solidFill>
-              </a:rPr>
-              <a:t>many</a:t>
-            </a:r>
-            <a:r>
-              <a:rPr lang="pl-PL" sz="2800" dirty="0">
-                <a:solidFill>
-                  <a:srgbClr val="0070C0"/>
-                </a:solidFill>
-              </a:rPr>
-              <a:t> </a:t>
-            </a:r>
-            <a:r>
-              <a:rPr lang="pl-PL" sz="2800" dirty="0" err="1">
-                <a:solidFill>
-                  <a:srgbClr val="0070C0"/>
-                </a:solidFill>
-              </a:rPr>
-              <a:t>language</a:t>
-            </a:r>
-            <a:r>
-              <a:rPr lang="pl-PL" sz="2800" dirty="0">
-                <a:solidFill>
-                  <a:srgbClr val="0070C0"/>
-                </a:solidFill>
-              </a:rPr>
-              <a:t>: </a:t>
-            </a:r>
-            <a:r>
-              <a:rPr lang="pl-PL" sz="2800" dirty="0" err="1">
-                <a:solidFill>
-                  <a:srgbClr val="0070C0"/>
-                </a:solidFill>
-              </a:rPr>
-              <a:t>Python</a:t>
-            </a:r>
-            <a:r>
-              <a:rPr lang="pl-PL" sz="2800" dirty="0">
-                <a:solidFill>
-                  <a:srgbClr val="0070C0"/>
-                </a:solidFill>
-              </a:rPr>
-              <a:t>, R(</a:t>
-            </a:r>
-            <a:r>
-              <a:rPr lang="pl-PL" sz="2800" dirty="0" err="1">
-                <a:solidFill>
-                  <a:srgbClr val="0070C0"/>
-                </a:solidFill>
-              </a:rPr>
-              <a:t>actually</a:t>
-            </a:r>
-            <a:r>
-              <a:rPr lang="pl-PL" sz="2800" dirty="0">
-                <a:solidFill>
-                  <a:srgbClr val="0070C0"/>
-                </a:solidFill>
-              </a:rPr>
-              <a:t> </a:t>
-            </a:r>
-            <a:r>
-              <a:rPr lang="pl-PL" sz="2800" dirty="0" err="1">
-                <a:solidFill>
-                  <a:srgbClr val="0070C0"/>
-                </a:solidFill>
-              </a:rPr>
-              <a:t>renv</a:t>
-            </a:r>
-            <a:r>
-              <a:rPr lang="pl-PL" sz="2800" dirty="0">
-                <a:solidFill>
-                  <a:srgbClr val="0070C0"/>
-                </a:solidFill>
-              </a:rPr>
-              <a:t> for R), </a:t>
-            </a:r>
-            <a:r>
-              <a:rPr lang="pl-PL" sz="2800" dirty="0" err="1">
-                <a:solidFill>
-                  <a:srgbClr val="0070C0"/>
-                </a:solidFill>
-              </a:rPr>
-              <a:t>Ruby</a:t>
-            </a:r>
-            <a:r>
-              <a:rPr lang="pl-PL" sz="2800" dirty="0">
-                <a:solidFill>
-                  <a:srgbClr val="0070C0"/>
-                </a:solidFill>
-              </a:rPr>
-              <a:t>, </a:t>
-            </a:r>
-            <a:r>
-              <a:rPr lang="pl-PL" sz="2800" dirty="0" err="1">
-                <a:solidFill>
-                  <a:srgbClr val="0070C0"/>
-                </a:solidFill>
-              </a:rPr>
-              <a:t>Lua</a:t>
-            </a:r>
-            <a:r>
-              <a:rPr lang="pl-PL" sz="2800" dirty="0">
-                <a:solidFill>
-                  <a:srgbClr val="0070C0"/>
-                </a:solidFill>
-              </a:rPr>
-              <a:t>, Scala, Java, JavaScript, C, C++, FORTRAN.</a:t>
+              <a:rPr lang="pl-PL" sz="2800" i="1" dirty="0" err="1">
+                <a:solidFill>
+                  <a:srgbClr val="0070C0"/>
+                </a:solidFill>
+              </a:rPr>
+              <a:t>works</a:t>
+            </a:r>
+            <a:r>
+              <a:rPr lang="pl-PL" sz="2800" i="1" dirty="0">
+                <a:solidFill>
+                  <a:srgbClr val="0070C0"/>
+                </a:solidFill>
+              </a:rPr>
+              <a:t> (</a:t>
+            </a:r>
+            <a:r>
+              <a:rPr lang="pl-PL" sz="2800" i="1" dirty="0" err="1">
+                <a:solidFill>
+                  <a:srgbClr val="0070C0"/>
+                </a:solidFill>
+              </a:rPr>
+              <a:t>only</a:t>
+            </a:r>
+            <a:r>
+              <a:rPr lang="pl-PL" sz="2800" i="1" dirty="0">
+                <a:solidFill>
+                  <a:srgbClr val="0070C0"/>
+                </a:solidFill>
+              </a:rPr>
+              <a:t>) on my </a:t>
+            </a:r>
+            <a:r>
+              <a:rPr lang="pl-PL" sz="2800" i="1" dirty="0" err="1">
+                <a:solidFill>
+                  <a:srgbClr val="0070C0"/>
+                </a:solidFill>
+              </a:rPr>
+              <a:t>machine</a:t>
+            </a:r>
+            <a:r>
+              <a:rPr lang="pl-PL" sz="2800" i="1" dirty="0">
+                <a:solidFill>
+                  <a:srgbClr val="0070C0"/>
+                </a:solidFill>
+              </a:rPr>
+              <a:t>”</a:t>
             </a:r>
           </a:p>
         </p:txBody>
@@ -8269,7 +7884,7 @@
     </p:spTree>
     <p:extLst>
       <p:ext uri="{BB962C8B-B14F-4D97-AF65-F5344CB8AC3E}">
-        <p14:creationId xmlns:p14="http://schemas.microsoft.com/office/powerpoint/2010/main" val="860260089"/>
+        <p14:creationId xmlns:p14="http://schemas.microsoft.com/office/powerpoint/2010/main" val="3591889222"/>
       </p:ext>
     </p:extLst>
   </p:cSld>
@@ -8311,7 +7926,7 @@
         <p:spPr>
           <a:xfrm>
             <a:off x="1138104" y="1569406"/>
-            <a:ext cx="9464530" cy="3108543"/>
+            <a:ext cx="9682566" cy="4832092"/>
           </a:xfrm>
           <a:prstGeom prst="rect">
             <a:avLst/>
@@ -8453,17 +8068,13 @@
             </a:endParaRPr>
           </a:p>
           <a:p>
-            <a:pPr marL="457200" indent="-457200">
-              <a:buFont typeface="Arial" panose="020B0604020202020204" pitchFamily="34" charset="0"/>
-              <a:buChar char="•"/>
-            </a:pPr>
-            <a:r>
-              <a:rPr lang="pl-PL" sz="2800" dirty="0" err="1">
-                <a:solidFill>
-                  <a:srgbClr val="0070C0"/>
-                </a:solidFill>
-              </a:rPr>
-              <a:t>always</a:t>
+            <a:r>
+              <a:rPr lang="pl-PL" sz="2800" dirty="0" err="1">
+                <a:solidFill>
+                  <a:srgbClr val="0070C0"/>
+                </a:solidFill>
+              </a:rPr>
+              <a:t>Conda</a:t>
             </a:r>
             <a:r>
               <a:rPr lang="pl-PL" sz="2800" dirty="0">
@@ -8479,86 +8090,6 @@
                   <a:srgbClr val="0070C0"/>
                 </a:solidFill>
               </a:rPr>
-              <a:t>use</a:t>
-            </a:r>
-            <a:r>
-              <a:rPr lang="pl-PL" sz="2800" dirty="0">
-                <a:solidFill>
-                  <a:srgbClr val="0070C0"/>
-                </a:solidFill>
-              </a:rPr>
-              <a:t> </a:t>
-            </a:r>
-            <a:r>
-              <a:rPr lang="pl-PL" sz="2800" dirty="0" err="1">
-                <a:solidFill>
-                  <a:srgbClr val="0070C0"/>
-                </a:solidFill>
-              </a:rPr>
-              <a:t>Conda</a:t>
-            </a:r>
-            <a:r>
-              <a:rPr lang="pl-PL" sz="2800" dirty="0">
-                <a:solidFill>
-                  <a:srgbClr val="0070C0"/>
-                </a:solidFill>
-              </a:rPr>
-              <a:t> </a:t>
-            </a:r>
-            <a:r>
-              <a:rPr lang="pl-PL" sz="2800" dirty="0" err="1">
-                <a:solidFill>
-                  <a:srgbClr val="0070C0"/>
-                </a:solidFill>
-              </a:rPr>
-              <a:t>environments</a:t>
-            </a:r>
-            <a:r>
-              <a:rPr lang="pl-PL" sz="2800" dirty="0">
-                <a:solidFill>
-                  <a:srgbClr val="0070C0"/>
-                </a:solidFill>
-              </a:rPr>
-              <a:t> to </a:t>
-            </a:r>
-            <a:r>
-              <a:rPr lang="pl-PL" sz="2800" dirty="0" err="1">
-                <a:solidFill>
-                  <a:srgbClr val="0070C0"/>
-                </a:solidFill>
-              </a:rPr>
-              <a:t>manage</a:t>
-            </a:r>
-            <a:r>
-              <a:rPr lang="pl-PL" sz="2800" dirty="0">
-                <a:solidFill>
-                  <a:srgbClr val="0070C0"/>
-                </a:solidFill>
-              </a:rPr>
-              <a:t> </a:t>
-            </a:r>
-            <a:r>
-              <a:rPr lang="pl-PL" sz="2800" dirty="0" err="1">
-                <a:solidFill>
-                  <a:srgbClr val="0070C0"/>
-                </a:solidFill>
-              </a:rPr>
-              <a:t>what</a:t>
-            </a:r>
-            <a:r>
-              <a:rPr lang="pl-PL" sz="2800" dirty="0">
-                <a:solidFill>
-                  <a:srgbClr val="0070C0"/>
-                </a:solidFill>
-              </a:rPr>
-              <a:t> </a:t>
-            </a:r>
-            <a:r>
-              <a:rPr lang="pl-PL" sz="2800" dirty="0" err="1">
-                <a:solidFill>
-                  <a:srgbClr val="0070C0"/>
-                </a:solidFill>
-              </a:rPr>
               <a:t>is</a:t>
             </a:r>
             <a:r>
@@ -8567,134 +8098,26 @@
                   <a:srgbClr val="0070C0"/>
                 </a:solidFill>
               </a:rPr>
-              <a:t> </a:t>
-            </a:r>
-            <a:r>
-              <a:rPr lang="pl-PL" sz="2800" dirty="0" err="1">
-                <a:solidFill>
-                  <a:srgbClr val="0070C0"/>
-                </a:solidFill>
-              </a:rPr>
-              <a:t>installed</a:t>
-            </a:r>
-            <a:r>
-              <a:rPr lang="pl-PL" sz="2800" dirty="0">
-                <a:solidFill>
-                  <a:srgbClr val="0070C0"/>
-                </a:solidFill>
-              </a:rPr>
-              <a:t> in </a:t>
-            </a:r>
-            <a:r>
-              <a:rPr lang="pl-PL" sz="2800" dirty="0" err="1">
-                <a:solidFill>
-                  <a:srgbClr val="0070C0"/>
-                </a:solidFill>
-              </a:rPr>
-              <a:t>your</a:t>
-            </a:r>
-            <a:r>
-              <a:rPr lang="pl-PL" sz="2800" dirty="0">
-                <a:solidFill>
-                  <a:srgbClr val="0070C0"/>
-                </a:solidFill>
-              </a:rPr>
-              <a:t> system</a:t>
-            </a:r>
-          </a:p>
-          <a:p>
-            <a:pPr marL="457200" indent="-457200">
-              <a:buFont typeface="Arial" panose="020B0604020202020204" pitchFamily="34" charset="0"/>
-              <a:buChar char="•"/>
-            </a:pPr>
-            <a:r>
-              <a:rPr lang="pl-PL" sz="2800" dirty="0" err="1">
-                <a:solidFill>
-                  <a:srgbClr val="0070C0"/>
-                </a:solidFill>
-              </a:rPr>
-              <a:t>create</a:t>
-            </a:r>
-            <a:r>
-              <a:rPr lang="pl-PL" sz="2800" dirty="0">
-                <a:solidFill>
-                  <a:srgbClr val="0070C0"/>
-                </a:solidFill>
-              </a:rPr>
-              <a:t> </a:t>
-            </a:r>
-            <a:r>
-              <a:rPr lang="pl-PL" sz="2800" dirty="0" err="1">
-                <a:solidFill>
-                  <a:srgbClr val="0070C0"/>
-                </a:solidFill>
-              </a:rPr>
-              <a:t>new</a:t>
-            </a:r>
-            <a:r>
-              <a:rPr lang="pl-PL" sz="2800" dirty="0">
-                <a:solidFill>
-                  <a:srgbClr val="0070C0"/>
-                </a:solidFill>
-              </a:rPr>
-              <a:t> </a:t>
-            </a:r>
-            <a:r>
-              <a:rPr lang="pl-PL" sz="2800" dirty="0" err="1">
-                <a:solidFill>
-                  <a:srgbClr val="0070C0"/>
-                </a:solidFill>
-              </a:rPr>
-              <a:t>Conda</a:t>
-            </a:r>
-            <a:r>
-              <a:rPr lang="pl-PL" sz="2800" dirty="0">
-                <a:solidFill>
-                  <a:srgbClr val="0070C0"/>
-                </a:solidFill>
-              </a:rPr>
-              <a:t> environment for </a:t>
-            </a:r>
-            <a:r>
-              <a:rPr lang="pl-PL" sz="2800" dirty="0" err="1">
-                <a:solidFill>
-                  <a:srgbClr val="0070C0"/>
-                </a:solidFill>
-              </a:rPr>
-              <a:t>any</a:t>
-            </a:r>
-            <a:r>
-              <a:rPr lang="pl-PL" sz="2800" dirty="0">
-                <a:solidFill>
-                  <a:srgbClr val="0070C0"/>
-                </a:solidFill>
-              </a:rPr>
-              <a:t> </a:t>
-            </a:r>
-            <a:r>
-              <a:rPr lang="pl-PL" sz="2800" dirty="0" err="1">
-                <a:solidFill>
-                  <a:srgbClr val="0070C0"/>
-                </a:solidFill>
-              </a:rPr>
-              <a:t>new</a:t>
-            </a:r>
-            <a:r>
-              <a:rPr lang="pl-PL" sz="2800" dirty="0">
-                <a:solidFill>
-                  <a:srgbClr val="0070C0"/>
-                </a:solidFill>
-              </a:rPr>
-              <a:t> </a:t>
-            </a:r>
-            <a:r>
-              <a:rPr lang="pl-PL" sz="2800" dirty="0" err="1">
-                <a:solidFill>
-                  <a:srgbClr val="0070C0"/>
-                </a:solidFill>
-              </a:rPr>
-              <a:t>project</a:t>
-            </a:r>
+              <a:t> a </a:t>
+            </a:r>
+            <a:r>
+              <a:rPr lang="pl-PL" sz="2800" dirty="0" err="1">
+                <a:solidFill>
+                  <a:srgbClr val="0070C0"/>
+                </a:solidFill>
+              </a:rPr>
+              <a:t>package</a:t>
+            </a:r>
+            <a:r>
+              <a:rPr lang="pl-PL" sz="2800" dirty="0">
+                <a:solidFill>
+                  <a:srgbClr val="0070C0"/>
+                </a:solidFill>
+              </a:rPr>
+              <a:t> management system for Win, Mac OS, Linux.</a:t>
+            </a:r>
+          </a:p>
+          <a:p>
             <a:endParaRPr lang="pl-PL" sz="2800" dirty="0">
               <a:solidFill>
                 <a:srgbClr val="0070C0"/>
@@ -8702,33 +8125,13 @@
             </a:endParaRPr>
           </a:p>
           <a:p>
-            <a:pPr marL="457200" indent="-457200">
-              <a:buFont typeface="Arial" panose="020B0604020202020204" pitchFamily="34" charset="0"/>
-              <a:buChar char="•"/>
-            </a:pPr>
-            <a:r>
-              <a:rPr lang="pl-PL" sz="2800" dirty="0" err="1">
-                <a:solidFill>
-                  <a:srgbClr val="0070C0"/>
-                </a:solidFill>
-              </a:rPr>
-              <a:t>keep</a:t>
-            </a:r>
-            <a:r>
-              <a:rPr lang="pl-PL" sz="2800" dirty="0">
-                <a:solidFill>
-                  <a:srgbClr val="0070C0"/>
-                </a:solidFill>
-              </a:rPr>
-              <a:t> a list of </a:t>
-            </a:r>
-            <a:r>
-              <a:rPr lang="pl-PL" sz="2800" dirty="0" err="1">
-                <a:solidFill>
-                  <a:srgbClr val="0070C0"/>
-                </a:solidFill>
-              </a:rPr>
-              <a:t>what</a:t>
+            <a:r>
+              <a:rPr lang="pl-PL" sz="2800" dirty="0" err="1">
+                <a:solidFill>
+                  <a:srgbClr val="0070C0"/>
+                </a:solidFill>
+              </a:rPr>
+              <a:t>Conda</a:t>
             </a:r>
             <a:r>
               <a:rPr lang="pl-PL" sz="2800" dirty="0">
@@ -8744,7 +8147,39 @@
                   <a:srgbClr val="0070C0"/>
                 </a:solidFill>
               </a:rPr>
-              <a:t>you</a:t>
+              <a:t>install</a:t>
+            </a:r>
+            <a:r>
+              <a:rPr lang="pl-PL" sz="2800" dirty="0">
+                <a:solidFill>
+                  <a:srgbClr val="0070C0"/>
+                </a:solidFill>
+              </a:rPr>
+              <a:t>, run, and update </a:t>
+            </a:r>
+            <a:r>
+              <a:rPr lang="pl-PL" sz="2800" dirty="0" err="1">
+                <a:solidFill>
+                  <a:srgbClr val="0070C0"/>
+                </a:solidFill>
+              </a:rPr>
+              <a:t>packages</a:t>
+            </a:r>
+            <a:r>
+              <a:rPr lang="pl-PL" sz="2800" dirty="0">
+                <a:solidFill>
+                  <a:srgbClr val="0070C0"/>
+                </a:solidFill>
+              </a:rPr>
+              <a:t> and </a:t>
+            </a:r>
+            <a:r>
+              <a:rPr lang="pl-PL" sz="2800" dirty="0" err="1">
+                <a:solidFill>
+                  <a:srgbClr val="0070C0"/>
+                </a:solidFill>
+              </a:rPr>
+              <a:t>their</a:t>
             </a:r>
             <a:r>
               <a:rPr lang="pl-PL" sz="2800" dirty="0">
@@ -8760,31 +8195,257 @@
                   <a:srgbClr val="0070C0"/>
                 </a:solidFill>
               </a:rPr>
-              <a:t>installed</a:t>
-            </a:r>
-            <a:r>
-              <a:rPr lang="pl-PL" sz="2800" dirty="0">
-                <a:solidFill>
-                  <a:srgbClr val="0070C0"/>
-                </a:solidFill>
-              </a:rPr>
-              <a:t> (and in </a:t>
-            </a:r>
-            <a:r>
-              <a:rPr lang="pl-PL" sz="2800" dirty="0" err="1">
-                <a:solidFill>
-                  <a:srgbClr val="0070C0"/>
-                </a:solidFill>
-              </a:rPr>
-              <a:t>which</a:t>
-            </a:r>
-            <a:r>
-              <a:rPr lang="pl-PL" sz="2800" dirty="0">
-                <a:solidFill>
-                  <a:srgbClr val="0070C0"/>
-                </a:solidFill>
-              </a:rPr>
-              <a:t> order)</a:t>
+              <a:t>dependencies</a:t>
+            </a:r>
+            <a:r>
+              <a:rPr lang="pl-PL" sz="2800" dirty="0">
+                <a:solidFill>
+                  <a:srgbClr val="0070C0"/>
+                </a:solidFill>
+              </a:rPr>
+              <a:t>.</a:t>
+            </a:r>
+          </a:p>
+          <a:p>
+            <a:endParaRPr lang="pl-PL" sz="2800" dirty="0">
+              <a:solidFill>
+                <a:srgbClr val="0070C0"/>
+              </a:solidFill>
+            </a:endParaRPr>
+          </a:p>
+          <a:p>
+            <a:r>
+              <a:rPr lang="pl-PL" sz="2800" dirty="0" err="1">
+                <a:solidFill>
+                  <a:srgbClr val="0070C0"/>
+                </a:solidFill>
+              </a:rPr>
+              <a:t>Conda</a:t>
+            </a:r>
+            <a:r>
+              <a:rPr lang="pl-PL" sz="2800" dirty="0">
+                <a:solidFill>
+                  <a:srgbClr val="0070C0"/>
+                </a:solidFill>
+              </a:rPr>
+              <a:t> </a:t>
+            </a:r>
+            <a:r>
+              <a:rPr lang="pl-PL" sz="2800" dirty="0" err="1">
+                <a:solidFill>
+                  <a:srgbClr val="0070C0"/>
+                </a:solidFill>
+              </a:rPr>
+              <a:t>can</a:t>
+            </a:r>
+            <a:r>
+              <a:rPr lang="pl-PL" sz="2800" dirty="0">
+                <a:solidFill>
+                  <a:srgbClr val="0070C0"/>
+                </a:solidFill>
+              </a:rPr>
+              <a:t> </a:t>
+            </a:r>
+            <a:r>
+              <a:rPr lang="pl-PL" sz="2800" dirty="0" err="1">
+                <a:solidFill>
+                  <a:srgbClr val="0070C0"/>
+                </a:solidFill>
+              </a:rPr>
+              <a:t>switch</a:t>
+            </a:r>
+            <a:r>
+              <a:rPr lang="pl-PL" sz="2800" dirty="0">
+                <a:solidFill>
+                  <a:srgbClr val="0070C0"/>
+                </a:solidFill>
+              </a:rPr>
+              <a:t> </a:t>
+            </a:r>
+            <a:r>
+              <a:rPr lang="pl-PL" sz="2800" dirty="0" err="1">
+                <a:solidFill>
+                  <a:srgbClr val="0070C0"/>
+                </a:solidFill>
+              </a:rPr>
+              <a:t>between</a:t>
+            </a:r>
+            <a:r>
+              <a:rPr lang="pl-PL" sz="2800" dirty="0">
+                <a:solidFill>
+                  <a:srgbClr val="0070C0"/>
+                </a:solidFill>
+              </a:rPr>
+              <a:t> </a:t>
+            </a:r>
+            <a:r>
+              <a:rPr lang="pl-PL" sz="2800" dirty="0" err="1">
+                <a:solidFill>
+                  <a:srgbClr val="0070C0"/>
+                </a:solidFill>
+              </a:rPr>
+              <a:t>project</a:t>
+            </a:r>
+            <a:r>
+              <a:rPr lang="pl-PL" sz="2800" dirty="0">
+                <a:solidFill>
+                  <a:srgbClr val="0070C0"/>
+                </a:solidFill>
+              </a:rPr>
+              <a:t> </a:t>
+            </a:r>
+            <a:r>
+              <a:rPr lang="pl-PL" sz="2800" dirty="0" err="1">
+                <a:solidFill>
+                  <a:srgbClr val="0070C0"/>
+                </a:solidFill>
+              </a:rPr>
+              <a:t>environments</a:t>
+            </a:r>
+            <a:r>
+              <a:rPr lang="pl-PL" sz="2800" dirty="0">
+                <a:solidFill>
+                  <a:srgbClr val="0070C0"/>
+                </a:solidFill>
+              </a:rPr>
+              <a:t>.</a:t>
+            </a:r>
+          </a:p>
+          <a:p>
+            <a:endParaRPr lang="pl-PL" sz="2800" dirty="0">
+              <a:solidFill>
+                <a:srgbClr val="0070C0"/>
+              </a:solidFill>
+            </a:endParaRPr>
+          </a:p>
+          <a:p>
+            <a:r>
+              <a:rPr lang="pl-PL" sz="2800" dirty="0" err="1">
+                <a:solidFill>
+                  <a:srgbClr val="0070C0"/>
+                </a:solidFill>
+              </a:rPr>
+              <a:t>Conda</a:t>
+            </a:r>
+            <a:r>
+              <a:rPr lang="pl-PL" sz="2800" dirty="0">
+                <a:solidFill>
+                  <a:srgbClr val="0070C0"/>
+                </a:solidFill>
+              </a:rPr>
+              <a:t> suport </a:t>
+            </a:r>
+            <a:r>
+              <a:rPr lang="pl-PL" sz="2800" dirty="0" err="1">
+                <a:solidFill>
+                  <a:srgbClr val="0070C0"/>
+                </a:solidFill>
+              </a:rPr>
+              <a:t>many</a:t>
+            </a:r>
+            <a:r>
+              <a:rPr lang="pl-PL" sz="2800" dirty="0">
+                <a:solidFill>
+                  <a:srgbClr val="0070C0"/>
+                </a:solidFill>
+              </a:rPr>
+              <a:t> </a:t>
+            </a:r>
+            <a:r>
+              <a:rPr lang="pl-PL" sz="2800" dirty="0" err="1">
+                <a:solidFill>
+                  <a:srgbClr val="0070C0"/>
+                </a:solidFill>
+              </a:rPr>
+              <a:t>language</a:t>
+            </a:r>
+            <a:r>
+              <a:rPr lang="pl-PL" sz="2800" dirty="0">
+                <a:solidFill>
+                  <a:srgbClr val="0070C0"/>
+                </a:solidFill>
+              </a:rPr>
+              <a:t>: </a:t>
+            </a:r>
+            <a:r>
+              <a:rPr lang="pl-PL" sz="2800" dirty="0" err="1">
+                <a:solidFill>
+                  <a:srgbClr val="0070C0"/>
+                </a:solidFill>
+              </a:rPr>
+              <a:t>Python</a:t>
+            </a:r>
+            <a:r>
+              <a:rPr lang="pl-PL" sz="2800" dirty="0">
+                <a:solidFill>
+                  <a:srgbClr val="0070C0"/>
+                </a:solidFill>
+              </a:rPr>
+              <a:t>, R(</a:t>
+            </a:r>
+            <a:r>
+              <a:rPr lang="pl-PL" sz="2800" dirty="0" err="1">
+                <a:solidFill>
+                  <a:srgbClr val="0070C0"/>
+                </a:solidFill>
+              </a:rPr>
+              <a:t>actually</a:t>
+            </a:r>
+            <a:r>
+              <a:rPr lang="pl-PL" sz="2800" dirty="0">
+                <a:solidFill>
+                  <a:srgbClr val="0070C0"/>
+                </a:solidFill>
+              </a:rPr>
+              <a:t> </a:t>
+            </a:r>
+            <a:r>
+              <a:rPr lang="pl-PL" sz="2800" dirty="0" err="1">
+                <a:solidFill>
+                  <a:srgbClr val="0070C0"/>
+                </a:solidFill>
+              </a:rPr>
+              <a:t>renv</a:t>
+            </a:r>
+            <a:r>
+              <a:rPr lang="pl-PL" sz="2800" dirty="0">
+                <a:solidFill>
+                  <a:srgbClr val="0070C0"/>
+                </a:solidFill>
+              </a:rPr>
+              <a:t> for R), </a:t>
+            </a:r>
+            <a:r>
+              <a:rPr lang="pl-PL" sz="2800" dirty="0" err="1">
+                <a:solidFill>
+                  <a:srgbClr val="0070C0"/>
+                </a:solidFill>
+              </a:rPr>
+              <a:t>Ruby</a:t>
+            </a:r>
+            <a:r>
+              <a:rPr lang="pl-PL" sz="2800" dirty="0">
+                <a:solidFill>
+                  <a:srgbClr val="0070C0"/>
+                </a:solidFill>
+              </a:rPr>
+              <a:t>, </a:t>
+            </a:r>
+            <a:r>
+              <a:rPr lang="pl-PL" sz="2800" dirty="0" err="1">
+                <a:solidFill>
+                  <a:srgbClr val="0070C0"/>
+                </a:solidFill>
+              </a:rPr>
+              <a:t>Lua</a:t>
+            </a:r>
+            <a:r>
+              <a:rPr lang="pl-PL" sz="2800" dirty="0">
+                <a:solidFill>
+                  <a:srgbClr val="0070C0"/>
+                </a:solidFill>
+              </a:rPr>
+              <a:t>, Scala, Java, JavaScript, C, C++, FORTRAN.</a:t>
             </a:r>
           </a:p>
         </p:txBody>
@@ -8891,7 +8552,7 @@
     </p:spTree>
     <p:extLst>
       <p:ext uri="{BB962C8B-B14F-4D97-AF65-F5344CB8AC3E}">
-        <p14:creationId xmlns:p14="http://schemas.microsoft.com/office/powerpoint/2010/main" val="3407180345"/>
+        <p14:creationId xmlns:p14="http://schemas.microsoft.com/office/powerpoint/2010/main" val="860260089"/>
       </p:ext>
     </p:extLst>
   </p:cSld>
@@ -8933,7 +8594,7 @@
         <p:spPr>
           <a:xfrm>
             <a:off x="1138104" y="1569406"/>
-            <a:ext cx="9464530" cy="2246769"/>
+            <a:ext cx="9464530" cy="3108543"/>
           </a:xfrm>
           <a:prstGeom prst="rect">
             <a:avLst/>
@@ -8952,23 +8613,119 @@
                   <a:srgbClr val="0070C0"/>
                 </a:solidFill>
               </a:rPr>
-              <a:t>Ed-DASH </a:t>
-            </a:r>
-            <a:r>
-              <a:rPr lang="pl-PL" sz="2800" dirty="0" err="1">
-                <a:solidFill>
-                  <a:srgbClr val="0070C0"/>
-                </a:solidFill>
-              </a:rPr>
-              <a:t>courses</a:t>
-            </a:r>
-            <a:r>
-              <a:rPr lang="pl-PL" sz="2800" dirty="0">
-                <a:solidFill>
-                  <a:srgbClr val="0070C0"/>
-                </a:solidFill>
-              </a:rPr>
-              <a:t>:</a:t>
+              <a:t>R and </a:t>
+            </a:r>
+            <a:r>
+              <a:rPr lang="pl-PL" sz="2800" dirty="0" err="1">
+                <a:solidFill>
+                  <a:srgbClr val="0070C0"/>
+                </a:solidFill>
+              </a:rPr>
+              <a:t>Python</a:t>
+            </a:r>
+            <a:r>
+              <a:rPr lang="pl-PL" sz="2800" dirty="0">
+                <a:solidFill>
+                  <a:srgbClr val="0070C0"/>
+                </a:solidFill>
+              </a:rPr>
+              <a:t> </a:t>
+            </a:r>
+            <a:r>
+              <a:rPr lang="pl-PL" sz="2800" dirty="0" err="1">
+                <a:solidFill>
+                  <a:srgbClr val="0070C0"/>
+                </a:solidFill>
+              </a:rPr>
+              <a:t>behaviour</a:t>
+            </a:r>
+            <a:r>
+              <a:rPr lang="pl-PL" sz="2800" dirty="0">
+                <a:solidFill>
+                  <a:srgbClr val="0070C0"/>
+                </a:solidFill>
+              </a:rPr>
+              <a:t> </a:t>
+            </a:r>
+            <a:r>
+              <a:rPr lang="pl-PL" sz="2800" dirty="0" err="1">
+                <a:solidFill>
+                  <a:srgbClr val="0070C0"/>
+                </a:solidFill>
+              </a:rPr>
+              <a:t>depends</a:t>
+            </a:r>
+            <a:r>
+              <a:rPr lang="pl-PL" sz="2800" dirty="0">
+                <a:solidFill>
+                  <a:srgbClr val="0070C0"/>
+                </a:solidFill>
+              </a:rPr>
+              <a:t> on </a:t>
+            </a:r>
+            <a:r>
+              <a:rPr lang="pl-PL" sz="2800" dirty="0" err="1">
+                <a:solidFill>
+                  <a:srgbClr val="0070C0"/>
+                </a:solidFill>
+              </a:rPr>
+              <a:t>what</a:t>
+            </a:r>
+            <a:r>
+              <a:rPr lang="pl-PL" sz="2800" dirty="0">
+                <a:solidFill>
+                  <a:srgbClr val="0070C0"/>
+                </a:solidFill>
+              </a:rPr>
+              <a:t> </a:t>
+            </a:r>
+            <a:r>
+              <a:rPr lang="pl-PL" sz="2800" dirty="0" err="1">
+                <a:solidFill>
+                  <a:srgbClr val="0070C0"/>
+                </a:solidFill>
+              </a:rPr>
+              <a:t>is</a:t>
+            </a:r>
+            <a:r>
+              <a:rPr lang="pl-PL" sz="2800" dirty="0">
+                <a:solidFill>
+                  <a:srgbClr val="0070C0"/>
+                </a:solidFill>
+              </a:rPr>
+              <a:t> </a:t>
+            </a:r>
+            <a:r>
+              <a:rPr lang="pl-PL" sz="2800" dirty="0" err="1">
+                <a:solidFill>
+                  <a:srgbClr val="0070C0"/>
+                </a:solidFill>
+              </a:rPr>
+              <a:t>installed</a:t>
+            </a:r>
+            <a:r>
+              <a:rPr lang="pl-PL" sz="2800" dirty="0">
+                <a:solidFill>
+                  <a:srgbClr val="0070C0"/>
+                </a:solidFill>
+              </a:rPr>
+              <a:t> in </a:t>
+            </a:r>
+            <a:r>
+              <a:rPr lang="pl-PL" sz="2800" dirty="0" err="1">
+                <a:solidFill>
+                  <a:srgbClr val="0070C0"/>
+                </a:solidFill>
+              </a:rPr>
+              <a:t>your</a:t>
+            </a:r>
+            <a:r>
+              <a:rPr lang="pl-PL" sz="2800" dirty="0">
+                <a:solidFill>
+                  <a:srgbClr val="0070C0"/>
+                </a:solidFill>
+              </a:rPr>
+              <a:t> system</a:t>
             </a:r>
           </a:p>
           <a:p>
@@ -8979,16 +8736,248 @@
             </a:endParaRPr>
           </a:p>
           <a:p>
-            <a:r>
-              <a:rPr lang="pl-PL" sz="2800" dirty="0">
-                <a:solidFill>
-                  <a:srgbClr val="0070C0"/>
-                </a:solidFill>
-              </a:rPr>
-              <a:t>https://edcarp.github.io/Ed-DaSH/workshops.html</a:t>
-            </a:r>
-          </a:p>
-          <a:p>
+            <a:pPr marL="457200" indent="-457200">
+              <a:buFont typeface="Arial" panose="020B0604020202020204" pitchFamily="34" charset="0"/>
+              <a:buChar char="•"/>
+            </a:pPr>
+            <a:r>
+              <a:rPr lang="pl-PL" sz="2800" dirty="0" err="1">
+                <a:solidFill>
+                  <a:srgbClr val="0070C0"/>
+                </a:solidFill>
+              </a:rPr>
+              <a:t>always</a:t>
+            </a:r>
+            <a:r>
+              <a:rPr lang="pl-PL" sz="2800" dirty="0">
+                <a:solidFill>
+                  <a:srgbClr val="0070C0"/>
+                </a:solidFill>
+              </a:rPr>
+              <a:t> </a:t>
+            </a:r>
+            <a:r>
+              <a:rPr lang="pl-PL" sz="2800" dirty="0" err="1">
+                <a:solidFill>
+                  <a:srgbClr val="0070C0"/>
+                </a:solidFill>
+              </a:rPr>
+              <a:t>use</a:t>
+            </a:r>
+            <a:r>
+              <a:rPr lang="pl-PL" sz="2800" dirty="0">
+                <a:solidFill>
+                  <a:srgbClr val="0070C0"/>
+                </a:solidFill>
+              </a:rPr>
+              <a:t> </a:t>
+            </a:r>
+            <a:r>
+              <a:rPr lang="pl-PL" sz="2800" dirty="0" err="1">
+                <a:solidFill>
+                  <a:srgbClr val="0070C0"/>
+                </a:solidFill>
+              </a:rPr>
+              <a:t>Conda</a:t>
+            </a:r>
+            <a:r>
+              <a:rPr lang="pl-PL" sz="2800" dirty="0">
+                <a:solidFill>
+                  <a:srgbClr val="0070C0"/>
+                </a:solidFill>
+              </a:rPr>
+              <a:t> </a:t>
+            </a:r>
+            <a:r>
+              <a:rPr lang="pl-PL" sz="2800" dirty="0" err="1">
+                <a:solidFill>
+                  <a:srgbClr val="0070C0"/>
+                </a:solidFill>
+              </a:rPr>
+              <a:t>environments</a:t>
+            </a:r>
+            <a:r>
+              <a:rPr lang="pl-PL" sz="2800" dirty="0">
+                <a:solidFill>
+                  <a:srgbClr val="0070C0"/>
+                </a:solidFill>
+              </a:rPr>
+              <a:t> to </a:t>
+            </a:r>
+            <a:r>
+              <a:rPr lang="pl-PL" sz="2800" dirty="0" err="1">
+                <a:solidFill>
+                  <a:srgbClr val="0070C0"/>
+                </a:solidFill>
+              </a:rPr>
+              <a:t>manage</a:t>
+            </a:r>
+            <a:r>
+              <a:rPr lang="pl-PL" sz="2800" dirty="0">
+                <a:solidFill>
+                  <a:srgbClr val="0070C0"/>
+                </a:solidFill>
+              </a:rPr>
+              <a:t> </a:t>
+            </a:r>
+            <a:r>
+              <a:rPr lang="pl-PL" sz="2800" dirty="0" err="1">
+                <a:solidFill>
+                  <a:srgbClr val="0070C0"/>
+                </a:solidFill>
+              </a:rPr>
+              <a:t>what</a:t>
+            </a:r>
+            <a:r>
+              <a:rPr lang="pl-PL" sz="2800" dirty="0">
+                <a:solidFill>
+                  <a:srgbClr val="0070C0"/>
+                </a:solidFill>
+              </a:rPr>
+              <a:t> </a:t>
+            </a:r>
+            <a:r>
+              <a:rPr lang="pl-PL" sz="2800" dirty="0" err="1">
+                <a:solidFill>
+                  <a:srgbClr val="0070C0"/>
+                </a:solidFill>
+              </a:rPr>
+              <a:t>is</a:t>
+            </a:r>
+            <a:r>
+              <a:rPr lang="pl-PL" sz="2800" dirty="0">
+                <a:solidFill>
+                  <a:srgbClr val="0070C0"/>
+                </a:solidFill>
+              </a:rPr>
+              <a:t> </a:t>
+            </a:r>
+            <a:r>
+              <a:rPr lang="pl-PL" sz="2800" dirty="0" err="1">
+                <a:solidFill>
+                  <a:srgbClr val="0070C0"/>
+                </a:solidFill>
+              </a:rPr>
+              <a:t>installed</a:t>
+            </a:r>
+            <a:r>
+              <a:rPr lang="pl-PL" sz="2800" dirty="0">
+                <a:solidFill>
+                  <a:srgbClr val="0070C0"/>
+                </a:solidFill>
+              </a:rPr>
+              <a:t> in </a:t>
+            </a:r>
+            <a:r>
+              <a:rPr lang="pl-PL" sz="2800" dirty="0" err="1">
+                <a:solidFill>
+                  <a:srgbClr val="0070C0"/>
+                </a:solidFill>
+              </a:rPr>
+              <a:t>your</a:t>
+            </a:r>
+            <a:r>
+              <a:rPr lang="pl-PL" sz="2800" dirty="0">
+                <a:solidFill>
+                  <a:srgbClr val="0070C0"/>
+                </a:solidFill>
+              </a:rPr>
+              <a:t> system</a:t>
+            </a:r>
+          </a:p>
+          <a:p>
+            <a:pPr marL="457200" indent="-457200">
+              <a:buFont typeface="Arial" panose="020B0604020202020204" pitchFamily="34" charset="0"/>
+              <a:buChar char="•"/>
+            </a:pPr>
+            <a:r>
+              <a:rPr lang="pl-PL" sz="2800" dirty="0" err="1">
+                <a:solidFill>
+                  <a:srgbClr val="0070C0"/>
+                </a:solidFill>
+              </a:rPr>
+              <a:t>create</a:t>
+            </a:r>
+            <a:r>
+              <a:rPr lang="pl-PL" sz="2800" dirty="0">
+                <a:solidFill>
+                  <a:srgbClr val="0070C0"/>
+                </a:solidFill>
+              </a:rPr>
+              <a:t> </a:t>
+            </a:r>
+            <a:r>
+              <a:rPr lang="pl-PL" sz="2800" dirty="0" err="1">
+                <a:solidFill>
+                  <a:srgbClr val="0070C0"/>
+                </a:solidFill>
+              </a:rPr>
+              <a:t>new</a:t>
+            </a:r>
+            <a:r>
+              <a:rPr lang="pl-PL" sz="2800" dirty="0">
+                <a:solidFill>
+                  <a:srgbClr val="0070C0"/>
+                </a:solidFill>
+              </a:rPr>
+              <a:t> </a:t>
+            </a:r>
+            <a:r>
+              <a:rPr lang="pl-PL" sz="2800" dirty="0" err="1">
+                <a:solidFill>
+                  <a:srgbClr val="0070C0"/>
+                </a:solidFill>
+              </a:rPr>
+              <a:t>Conda</a:t>
+            </a:r>
+            <a:r>
+              <a:rPr lang="pl-PL" sz="2800" dirty="0">
+                <a:solidFill>
+                  <a:srgbClr val="0070C0"/>
+                </a:solidFill>
+              </a:rPr>
+              <a:t> environment for </a:t>
+            </a:r>
+            <a:r>
+              <a:rPr lang="pl-PL" sz="2800" dirty="0" err="1">
+                <a:solidFill>
+                  <a:srgbClr val="0070C0"/>
+                </a:solidFill>
+              </a:rPr>
+              <a:t>any</a:t>
+            </a:r>
+            <a:r>
+              <a:rPr lang="pl-PL" sz="2800" dirty="0">
+                <a:solidFill>
+                  <a:srgbClr val="0070C0"/>
+                </a:solidFill>
+              </a:rPr>
+              <a:t> </a:t>
+            </a:r>
+            <a:r>
+              <a:rPr lang="pl-PL" sz="2800" dirty="0" err="1">
+                <a:solidFill>
+                  <a:srgbClr val="0070C0"/>
+                </a:solidFill>
+              </a:rPr>
+              <a:t>new</a:t>
+            </a:r>
+            <a:r>
+              <a:rPr lang="pl-PL" sz="2800" dirty="0">
+                <a:solidFill>
+                  <a:srgbClr val="0070C0"/>
+                </a:solidFill>
+              </a:rPr>
+              <a:t> </a:t>
+            </a:r>
+            <a:r>
+              <a:rPr lang="pl-PL" sz="2800" dirty="0" err="1">
+                <a:solidFill>
+                  <a:srgbClr val="0070C0"/>
+                </a:solidFill>
+              </a:rPr>
+              <a:t>project</a:t>
+            </a:r>
             <a:endParaRPr lang="pl-PL" sz="2800" dirty="0">
               <a:solidFill>
                 <a:srgbClr val="0070C0"/>
@@ -8996,43 +8985,90 @@
             </a:endParaRPr>
           </a:p>
           <a:p>
-            <a:r>
-              <a:rPr lang="pl-PL" sz="2800" dirty="0">
-                <a:solidFill>
-                  <a:srgbClr val="0070C0"/>
-                </a:solidFill>
-              </a:rPr>
-              <a:t>Shell, </a:t>
-            </a:r>
-            <a:r>
-              <a:rPr lang="pl-PL" sz="2800" dirty="0" err="1">
-                <a:solidFill>
-                  <a:srgbClr val="0070C0"/>
-                </a:solidFill>
-              </a:rPr>
-              <a:t>Conda</a:t>
-            </a:r>
-            <a:r>
-              <a:rPr lang="pl-PL" sz="2800" dirty="0">
-                <a:solidFill>
-                  <a:srgbClr val="0070C0"/>
-                </a:solidFill>
-              </a:rPr>
-              <a:t>, </a:t>
-            </a:r>
-            <a:r>
-              <a:rPr lang="pl-PL" sz="2800" dirty="0" err="1">
-                <a:solidFill>
-                  <a:srgbClr val="0070C0"/>
-                </a:solidFill>
-              </a:rPr>
-              <a:t>Workflows</a:t>
-            </a:r>
-            <a:endParaRPr lang="pl-PL" sz="2800" dirty="0">
-              <a:solidFill>
-                <a:srgbClr val="0070C0"/>
-              </a:solidFill>
-            </a:endParaRPr>
+            <a:pPr marL="457200" indent="-457200">
+              <a:buFont typeface="Arial" panose="020B0604020202020204" pitchFamily="34" charset="0"/>
+              <a:buChar char="•"/>
+            </a:pPr>
+            <a:r>
+              <a:rPr lang="pl-PL" sz="2800" dirty="0" err="1">
+                <a:solidFill>
+                  <a:srgbClr val="0070C0"/>
+                </a:solidFill>
+              </a:rPr>
+              <a:t>keep</a:t>
+            </a:r>
+            <a:r>
+              <a:rPr lang="pl-PL" sz="2800" dirty="0">
+                <a:solidFill>
+                  <a:srgbClr val="0070C0"/>
+                </a:solidFill>
+              </a:rPr>
+              <a:t> a list of </a:t>
+            </a:r>
+            <a:r>
+              <a:rPr lang="pl-PL" sz="2800" dirty="0" err="1">
+                <a:solidFill>
+                  <a:srgbClr val="0070C0"/>
+                </a:solidFill>
+              </a:rPr>
+              <a:t>what</a:t>
+            </a:r>
+            <a:r>
+              <a:rPr lang="pl-PL" sz="2800" dirty="0">
+                <a:solidFill>
+                  <a:srgbClr val="0070C0"/>
+                </a:solidFill>
+              </a:rPr>
+              <a:t> </a:t>
+            </a:r>
+            <a:r>
+              <a:rPr lang="pl-PL" sz="2800" dirty="0" err="1">
+                <a:solidFill>
+                  <a:srgbClr val="0070C0"/>
+                </a:solidFill>
+              </a:rPr>
+              <a:t>you</a:t>
+            </a:r>
+            <a:r>
+              <a:rPr lang="pl-PL" sz="2800" dirty="0">
+                <a:solidFill>
+                  <a:srgbClr val="0070C0"/>
+                </a:solidFill>
+              </a:rPr>
+              <a:t> </a:t>
+            </a:r>
+            <a:r>
+              <a:rPr lang="pl-PL" sz="2800" dirty="0" err="1">
+                <a:solidFill>
+                  <a:srgbClr val="0070C0"/>
+                </a:solidFill>
+              </a:rPr>
+              <a:t>installed</a:t>
+            </a:r>
+            <a:r>
+              <a:rPr lang="pl-PL" sz="2800" dirty="0">
+                <a:solidFill>
+                  <a:srgbClr val="0070C0"/>
+                </a:solidFill>
+              </a:rPr>
+              <a:t> (and in </a:t>
+            </a:r>
+            <a:r>
+              <a:rPr lang="pl-PL" sz="2800" dirty="0" err="1">
+                <a:solidFill>
+                  <a:srgbClr val="0070C0"/>
+                </a:solidFill>
+              </a:rPr>
+              <a:t>which</a:t>
+            </a:r>
+            <a:r>
+              <a:rPr lang="pl-PL" sz="2800" dirty="0">
+                <a:solidFill>
+                  <a:srgbClr val="0070C0"/>
+                </a:solidFill>
+              </a:rPr>
+              <a:t> order)</a:t>
+            </a:r>
           </a:p>
         </p:txBody>
       </p:sp>
@@ -9138,7 +9174,7 @@
     </p:spTree>
     <p:extLst>
       <p:ext uri="{BB962C8B-B14F-4D97-AF65-F5344CB8AC3E}">
-        <p14:creationId xmlns:p14="http://schemas.microsoft.com/office/powerpoint/2010/main" val="2832810949"/>
+        <p14:creationId xmlns:p14="http://schemas.microsoft.com/office/powerpoint/2010/main" val="3407180345"/>
       </p:ext>
     </p:extLst>
   </p:cSld>
@@ -9193,7 +9229,7 @@
           <a:graphicData uri="http://schemas.openxmlformats.org/presentationml/2006/ole">
             <mc:AlternateContent xmlns:mc="http://schemas.openxmlformats.org/markup-compatibility/2006">
               <mc:Choice xmlns:v="urn:schemas-microsoft-com:vml" Requires="v">
-                <p:oleObj spid="_x0000_s1032" name="Image" r:id="rId4" imgW="4926984" imgH="6171429" progId="Photoshop.Image.11">
+                <p:oleObj spid="_x0000_s1036" name="Image" r:id="rId4" imgW="4926984" imgH="6171429" progId="Photoshop.Image.11">
                   <p:embed/>
                 </p:oleObj>
               </mc:Choice>
@@ -9467,7 +9503,7 @@
           <a:graphicData uri="http://schemas.openxmlformats.org/presentationml/2006/ole">
             <mc:AlternateContent xmlns:mc="http://schemas.openxmlformats.org/markup-compatibility/2006">
               <mc:Choice xmlns:v="urn:schemas-microsoft-com:vml" Requires="v">
-                <p:oleObj spid="_x0000_s1033" name="Image" r:id="rId9" imgW="4926984" imgH="6171429" progId="Photoshop.Image.11">
+                <p:oleObj spid="_x0000_s1037" name="Image" r:id="rId9" imgW="4926984" imgH="6171429" progId="Photoshop.Image.11">
                   <p:embed/>
                 </p:oleObj>
               </mc:Choice>
@@ -10383,6 +10419,253 @@
         <p:spPr>
           <a:xfrm>
             <a:off x="1138104" y="1569406"/>
+            <a:ext cx="9464530" cy="2246769"/>
+          </a:xfrm>
+          <a:prstGeom prst="rect">
+            <a:avLst/>
+          </a:prstGeom>
+          <a:noFill/>
+        </p:spPr>
+        <p:txBody>
+          <a:bodyPr wrap="square">
+            <a:spAutoFit/>
+          </a:bodyPr>
+          <a:lstStyle/>
+          <a:p>
+            <a:r>
+              <a:rPr lang="pl-PL" sz="2800" dirty="0">
+                <a:solidFill>
+                  <a:srgbClr val="0070C0"/>
+                </a:solidFill>
+              </a:rPr>
+              <a:t>Ed-DASH </a:t>
+            </a:r>
+            <a:r>
+              <a:rPr lang="pl-PL" sz="2800" dirty="0" err="1">
+                <a:solidFill>
+                  <a:srgbClr val="0070C0"/>
+                </a:solidFill>
+              </a:rPr>
+              <a:t>courses</a:t>
+            </a:r>
+            <a:r>
+              <a:rPr lang="pl-PL" sz="2800" dirty="0">
+                <a:solidFill>
+                  <a:srgbClr val="0070C0"/>
+                </a:solidFill>
+              </a:rPr>
+              <a:t>:</a:t>
+            </a:r>
+          </a:p>
+          <a:p>
+            <a:endParaRPr lang="pl-PL" sz="2800" dirty="0">
+              <a:solidFill>
+                <a:srgbClr val="0070C0"/>
+              </a:solidFill>
+            </a:endParaRPr>
+          </a:p>
+          <a:p>
+            <a:r>
+              <a:rPr lang="pl-PL" sz="2800" dirty="0">
+                <a:solidFill>
+                  <a:srgbClr val="0070C0"/>
+                </a:solidFill>
+              </a:rPr>
+              <a:t>https://edcarp.github.io/Ed-DaSH/workshops.html</a:t>
+            </a:r>
+          </a:p>
+          <a:p>
+            <a:endParaRPr lang="pl-PL" sz="2800" dirty="0">
+              <a:solidFill>
+                <a:srgbClr val="0070C0"/>
+              </a:solidFill>
+            </a:endParaRPr>
+          </a:p>
+          <a:p>
+            <a:r>
+              <a:rPr lang="pl-PL" sz="2800" dirty="0">
+                <a:solidFill>
+                  <a:srgbClr val="0070C0"/>
+                </a:solidFill>
+              </a:rPr>
+              <a:t>Shell, </a:t>
+            </a:r>
+            <a:r>
+              <a:rPr lang="pl-PL" sz="2800" dirty="0" err="1">
+                <a:solidFill>
+                  <a:srgbClr val="0070C0"/>
+                </a:solidFill>
+              </a:rPr>
+              <a:t>Conda</a:t>
+            </a:r>
+            <a:r>
+              <a:rPr lang="pl-PL" sz="2800" dirty="0">
+                <a:solidFill>
+                  <a:srgbClr val="0070C0"/>
+                </a:solidFill>
+              </a:rPr>
+              <a:t>, </a:t>
+            </a:r>
+            <a:r>
+              <a:rPr lang="pl-PL" sz="2800" dirty="0" err="1">
+                <a:solidFill>
+                  <a:srgbClr val="0070C0"/>
+                </a:solidFill>
+              </a:rPr>
+              <a:t>Workflows</a:t>
+            </a:r>
+            <a:endParaRPr lang="pl-PL" sz="2800" dirty="0">
+              <a:solidFill>
+                <a:srgbClr val="0070C0"/>
+              </a:solidFill>
+            </a:endParaRPr>
+          </a:p>
+        </p:txBody>
+      </p:sp>
+      <p:pic>
+        <p:nvPicPr>
+          <p:cNvPr id="6" name="Picture 2" descr="Ed_DaSH">
+            <a:extLst>
+              <a:ext uri="{FF2B5EF4-FFF2-40B4-BE49-F238E27FC236}">
+                <a16:creationId xmlns:a16="http://schemas.microsoft.com/office/drawing/2014/main" id="{6F3CF586-06D2-46C3-A4A3-130E31C4A16F}"/>
+              </a:ext>
+            </a:extLst>
+          </p:cNvPr>
+          <p:cNvPicPr>
+            <a:picLocks noChangeAspect="1" noChangeArrowheads="1"/>
+          </p:cNvPicPr>
+          <p:nvPr/>
+        </p:nvPicPr>
+        <p:blipFill>
+          <a:blip r:embed="rId2" cstate="hqprint">
+            <a:extLst>
+              <a:ext uri="{28A0092B-C50C-407E-A947-70E740481C1C}">
+                <a14:useLocalDpi xmlns:a14="http://schemas.microsoft.com/office/drawing/2010/main" val="0"/>
+              </a:ext>
+            </a:extLst>
+          </a:blip>
+          <a:srcRect/>
+          <a:stretch>
+            <a:fillRect/>
+          </a:stretch>
+        </p:blipFill>
+        <p:spPr bwMode="auto">
+          <a:xfrm>
+            <a:off x="10820670" y="5458691"/>
+            <a:ext cx="1289214" cy="1325418"/>
+          </a:xfrm>
+          <a:prstGeom prst="rect">
+            <a:avLst/>
+          </a:prstGeom>
+          <a:noFill/>
+          <a:extLst>
+            <a:ext uri="{909E8E84-426E-40DD-AFC4-6F175D3DCCD1}">
+              <a14:hiddenFill xmlns:a14="http://schemas.microsoft.com/office/drawing/2010/main">
+                <a:solidFill>
+                  <a:srgbClr val="FFFFFF"/>
+                </a:solidFill>
+              </a14:hiddenFill>
+            </a:ext>
+          </a:extLst>
+        </p:spPr>
+      </p:pic>
+      <p:sp>
+        <p:nvSpPr>
+          <p:cNvPr id="4" name="Title 1">
+            <a:extLst>
+              <a:ext uri="{FF2B5EF4-FFF2-40B4-BE49-F238E27FC236}">
+                <a16:creationId xmlns:a16="http://schemas.microsoft.com/office/drawing/2014/main" id="{D21F9EF6-69ED-40F9-83C6-60B65781CE8B}"/>
+              </a:ext>
+            </a:extLst>
+          </p:cNvPr>
+          <p:cNvSpPr>
+            <a:spLocks noGrp="1"/>
+          </p:cNvSpPr>
+          <p:nvPr>
+            <p:ph type="title"/>
+          </p:nvPr>
+        </p:nvSpPr>
+        <p:spPr>
+          <a:xfrm>
+            <a:off x="838200" y="365125"/>
+            <a:ext cx="10515600" cy="587375"/>
+          </a:xfrm>
+        </p:spPr>
+        <p:txBody>
+          <a:bodyPr>
+            <a:normAutofit fontScale="90000"/>
+          </a:bodyPr>
+          <a:lstStyle/>
+          <a:p>
+            <a:r>
+              <a:rPr lang="pl-PL" dirty="0">
+                <a:solidFill>
+                  <a:srgbClr val="0070C0"/>
+                </a:solidFill>
+              </a:rPr>
+              <a:t>Computing in R and </a:t>
+            </a:r>
+            <a:r>
+              <a:rPr lang="pl-PL" dirty="0" err="1">
+                <a:solidFill>
+                  <a:srgbClr val="0070C0"/>
+                </a:solidFill>
+              </a:rPr>
+              <a:t>Python</a:t>
+            </a:r>
+            <a:endParaRPr lang="en-GB" dirty="0">
+              <a:solidFill>
+                <a:srgbClr val="0070C0"/>
+              </a:solidFill>
+            </a:endParaRPr>
+          </a:p>
+        </p:txBody>
+      </p:sp>
+    </p:spTree>
+    <p:extLst>
+      <p:ext uri="{BB962C8B-B14F-4D97-AF65-F5344CB8AC3E}">
+        <p14:creationId xmlns:p14="http://schemas.microsoft.com/office/powerpoint/2010/main" val="2832810949"/>
+      </p:ext>
+    </p:extLst>
+  </p:cSld>
+  <p:clrMapOvr>
+    <a:masterClrMapping/>
+  </p:clrMapOvr>
+</p:sld>
+</file>
+
+<file path=ppt/slides/slide21.xml><?xml version="1.0" encoding="utf-8"?>
+<p:sld xmlns:a="http://schemas.openxmlformats.org/drawingml/2006/main" xmlns:r="http://schemas.openxmlformats.org/officeDocument/2006/relationships" xmlns:p="http://schemas.openxmlformats.org/presentationml/2006/main">
+  <p:cSld>
+    <p:spTree>
+      <p:nvGrpSpPr>
+        <p:cNvPr id="1" name=""/>
+        <p:cNvGrpSpPr/>
+        <p:nvPr/>
+      </p:nvGrpSpPr>
+      <p:grpSpPr>
+        <a:xfrm>
+          <a:off x="0" y="0"/>
+          <a:ext cx="0" cy="0"/>
+          <a:chOff x="0" y="0"/>
+          <a:chExt cx="0" cy="0"/>
+        </a:xfrm>
+      </p:grpSpPr>
+      <p:sp>
+        <p:nvSpPr>
+          <p:cNvPr id="5" name="TextBox 4">
+            <a:extLst>
+              <a:ext uri="{FF2B5EF4-FFF2-40B4-BE49-F238E27FC236}">
+                <a16:creationId xmlns:a16="http://schemas.microsoft.com/office/drawing/2014/main" id="{3A7A1F5C-9C70-4DE3-BA39-7835B2935EB3}"/>
+              </a:ext>
+            </a:extLst>
+          </p:cNvPr>
+          <p:cNvSpPr txBox="1"/>
+          <p:nvPr/>
+        </p:nvSpPr>
+        <p:spPr>
+          <a:xfrm>
+            <a:off x="1138104" y="1569406"/>
             <a:ext cx="9464530" cy="3539430"/>
           </a:xfrm>
           <a:prstGeom prst="rect">
@@ -10490,11 +10773,6 @@
               </a:rPr>
               <a:t>single document helps to make your work more understandable, repeatable and shareable</a:t>
             </a:r>
-            <a:endParaRPr lang="en-GB" sz="2800" dirty="0">
-              <a:solidFill>
-                <a:srgbClr val="0070C0"/>
-              </a:solidFill>
-            </a:endParaRPr>
           </a:p>
         </p:txBody>
       </p:sp>
@@ -11329,23 +11607,7 @@
                   <a:srgbClr val="0070C0"/>
                 </a:solidFill>
               </a:rPr>
-              <a:t>More „powerful” / „professional” scientific plots than </a:t>
-            </a:r>
-            <a:r>
-              <a:rPr lang="en-GB" sz="2800" smtClean="0">
-                <a:solidFill>
-                  <a:srgbClr val="0070C0"/>
-                </a:solidFill>
-              </a:rPr>
-              <a:t>ones available </a:t>
-            </a:r>
-            <a:r>
-              <a:rPr lang="en-GB" sz="2800" dirty="0" smtClean="0">
-                <a:solidFill>
-                  <a:srgbClr val="0070C0"/>
-                </a:solidFill>
-              </a:rPr>
-              <a:t>in Excel</a:t>
+              <a:t>More „powerful” / „professional” scientific plots than ones available in Excel</a:t>
             </a:r>
           </a:p>
           <a:p>

</xml_diff>